<commit_message>
Add Developer Exception Page content
</commit_message>
<xml_diff>
--- a/Whats New in ASP.NET Core 3.0.pptx
+++ b/Whats New in ASP.NET Core 3.0.pptx
@@ -6,7 +6,7 @@
     <p:sldMasterId id="2147483755" r:id="rId5"/>
   </p:sldMasterIdLst>
   <p:notesMasterIdLst>
-    <p:notesMasterId r:id="rId21"/>
+    <p:notesMasterId r:id="rId25"/>
   </p:notesMasterIdLst>
   <p:sldIdLst>
     <p:sldId id="257" r:id="rId6"/>
@@ -21,9 +21,13 @@
     <p:sldId id="267" r:id="rId15"/>
     <p:sldId id="271" r:id="rId16"/>
     <p:sldId id="265" r:id="rId17"/>
-    <p:sldId id="269" r:id="rId18"/>
-    <p:sldId id="270" r:id="rId19"/>
-    <p:sldId id="261" r:id="rId20"/>
+    <p:sldId id="286" r:id="rId18"/>
+    <p:sldId id="287" r:id="rId19"/>
+    <p:sldId id="283" r:id="rId20"/>
+    <p:sldId id="284" r:id="rId21"/>
+    <p:sldId id="269" r:id="rId22"/>
+    <p:sldId id="270" r:id="rId23"/>
+    <p:sldId id="261" r:id="rId24"/>
   </p:sldIdLst>
   <p:sldSz cx="12192000" cy="6858000"/>
   <p:notesSz cx="6858000" cy="9144000"/>
@@ -139,6 +143,10 @@
             <p14:sldId id="267"/>
             <p14:sldId id="271"/>
             <p14:sldId id="265"/>
+            <p14:sldId id="286"/>
+            <p14:sldId id="287"/>
+            <p14:sldId id="283"/>
+            <p14:sldId id="284"/>
             <p14:sldId id="269"/>
             <p14:sldId id="270"/>
             <p14:sldId id="261"/>
@@ -4639,7 +4647,7 @@
           <a:bodyPr/>
           <a:lstStyle/>
           <a:p>
-            <a:endParaRPr lang="en-US"/>
+            <a:endParaRPr lang="en-US" dirty="0"/>
           </a:p>
         </p:txBody>
       </p:sp>
@@ -4650,7 +4658,7 @@
             <a:spLocks noGrp="1"/>
           </p:cNvSpPr>
           <p:nvPr>
-            <p:ph type="sldNum" sz="quarter" idx="10"/>
+            <p:ph type="sldNum" sz="quarter" idx="5"/>
           </p:nvPr>
         </p:nvSpPr>
         <p:spPr/>
@@ -4660,7 +4668,7 @@
           <a:p>
             <a:fld id="{E0AE778D-2A57-4226-B72B-26EA3CA60131}" type="slidenum">
               <a:rPr lang="en-US" smtClean="0"/>
-              <a:t>12</a:t>
+              <a:t>11</a:t>
             </a:fld>
             <a:endParaRPr lang="en-US"/>
           </a:p>
@@ -4669,7 +4677,7 @@
     </p:spTree>
     <p:extLst>
       <p:ext uri="{BB962C8B-B14F-4D97-AF65-F5344CB8AC3E}">
-        <p14:creationId xmlns:p14="http://schemas.microsoft.com/office/powerpoint/2010/main" val="3058631861"/>
+        <p14:creationId xmlns:p14="http://schemas.microsoft.com/office/powerpoint/2010/main" val="3049311925"/>
       </p:ext>
     </p:extLst>
   </p:cSld>
@@ -4744,7 +4752,7 @@
           <a:p>
             <a:fld id="{E0AE778D-2A57-4226-B72B-26EA3CA60131}" type="slidenum">
               <a:rPr lang="en-US" smtClean="0"/>
-              <a:t>13</a:t>
+              <a:t>12</a:t>
             </a:fld>
             <a:endParaRPr lang="en-US"/>
           </a:p>
@@ -4753,7 +4761,7 @@
     </p:spTree>
     <p:extLst>
       <p:ext uri="{BB962C8B-B14F-4D97-AF65-F5344CB8AC3E}">
-        <p14:creationId xmlns:p14="http://schemas.microsoft.com/office/powerpoint/2010/main" val="250187586"/>
+        <p14:creationId xmlns:p14="http://schemas.microsoft.com/office/powerpoint/2010/main" val="3058631861"/>
       </p:ext>
     </p:extLst>
   </p:cSld>
@@ -4807,9 +4815,23 @@
           <a:bodyPr/>
           <a:lstStyle/>
           <a:p>
+            <a:pPr marL="171450" indent="-171450">
+              <a:buFontTx/>
+              <a:buChar char="-"/>
+            </a:pPr>
             <a:r>
               <a:rPr lang="en-US" dirty="0"/>
-              <a:t>New roll-forward behaviors</a:t>
+              <a:t>ASP.NET Core 3.0 built on .NET Standard 2.1</a:t>
+            </a:r>
+          </a:p>
+          <a:p>
+            <a:pPr marL="171450" indent="-171450">
+              <a:buFontTx/>
+              <a:buChar char="-"/>
+            </a:pPr>
+            <a:r>
+              <a:rPr lang="en-US" dirty="0"/>
+              <a:t>.NET Standard is first version to NOT support .NET Framework</a:t>
             </a:r>
           </a:p>
         </p:txBody>
@@ -4831,7 +4853,7 @@
           <a:p>
             <a:fld id="{E0AE778D-2A57-4226-B72B-26EA3CA60131}" type="slidenum">
               <a:rPr lang="en-US" smtClean="0"/>
-              <a:t>14</a:t>
+              <a:t>13</a:t>
             </a:fld>
             <a:endParaRPr lang="en-US"/>
           </a:p>
@@ -4840,7 +4862,7 @@
     </p:spTree>
     <p:extLst>
       <p:ext uri="{BB962C8B-B14F-4D97-AF65-F5344CB8AC3E}">
-        <p14:creationId xmlns:p14="http://schemas.microsoft.com/office/powerpoint/2010/main" val="2064820010"/>
+        <p14:creationId xmlns:p14="http://schemas.microsoft.com/office/powerpoint/2010/main" val="1264634412"/>
       </p:ext>
     </p:extLst>
   </p:cSld>
@@ -4894,6 +4916,249 @@
           <a:bodyPr/>
           <a:lstStyle/>
           <a:p>
+            <a:pPr marL="171450" indent="-171450">
+              <a:buFontTx/>
+              <a:buChar char="-"/>
+            </a:pPr>
+            <a:r>
+              <a:rPr lang="en-US" dirty="0"/>
+              <a:t>ASP.NET Core 3.0 built on .NET Standard 2.1</a:t>
+            </a:r>
+          </a:p>
+          <a:p>
+            <a:pPr marL="171450" indent="-171450">
+              <a:buFontTx/>
+              <a:buChar char="-"/>
+            </a:pPr>
+            <a:r>
+              <a:rPr lang="en-US" dirty="0"/>
+              <a:t>.NET Standard is first version to NOT support .NET Framework</a:t>
+            </a:r>
+          </a:p>
+        </p:txBody>
+      </p:sp>
+      <p:sp>
+        <p:nvSpPr>
+          <p:cNvPr id="4" name="Slide Number Placeholder 3"/>
+          <p:cNvSpPr>
+            <a:spLocks noGrp="1"/>
+          </p:cNvSpPr>
+          <p:nvPr>
+            <p:ph type="sldNum" sz="quarter" idx="5"/>
+          </p:nvPr>
+        </p:nvSpPr>
+        <p:spPr/>
+        <p:txBody>
+          <a:bodyPr/>
+          <a:lstStyle/>
+          <a:p>
+            <a:fld id="{E0AE778D-2A57-4226-B72B-26EA3CA60131}" type="slidenum">
+              <a:rPr lang="en-US" smtClean="0"/>
+              <a:t>14</a:t>
+            </a:fld>
+            <a:endParaRPr lang="en-US"/>
+          </a:p>
+        </p:txBody>
+      </p:sp>
+    </p:spTree>
+    <p:extLst>
+      <p:ext uri="{BB962C8B-B14F-4D97-AF65-F5344CB8AC3E}">
+        <p14:creationId xmlns:p14="http://schemas.microsoft.com/office/powerpoint/2010/main" val="2424459341"/>
+      </p:ext>
+    </p:extLst>
+  </p:cSld>
+  <p:clrMapOvr>
+    <a:masterClrMapping/>
+  </p:clrMapOvr>
+</p:notes>
+</file>
+
+<file path=ppt/notesSlides/notesSlide15.xml><?xml version="1.0" encoding="utf-8"?>
+<p:notes xmlns:a="http://schemas.openxmlformats.org/drawingml/2006/main" xmlns:r="http://schemas.openxmlformats.org/officeDocument/2006/relationships" xmlns:p="http://schemas.openxmlformats.org/presentationml/2006/main">
+  <p:cSld>
+    <p:spTree>
+      <p:nvGrpSpPr>
+        <p:cNvPr id="1" name=""/>
+        <p:cNvGrpSpPr/>
+        <p:nvPr/>
+      </p:nvGrpSpPr>
+      <p:grpSpPr>
+        <a:xfrm>
+          <a:off x="0" y="0"/>
+          <a:ext cx="0" cy="0"/>
+          <a:chOff x="0" y="0"/>
+          <a:chExt cx="0" cy="0"/>
+        </a:xfrm>
+      </p:grpSpPr>
+      <p:sp>
+        <p:nvSpPr>
+          <p:cNvPr id="2" name="Slide Image Placeholder 1"/>
+          <p:cNvSpPr>
+            <a:spLocks noGrp="1" noRot="1" noChangeAspect="1"/>
+          </p:cNvSpPr>
+          <p:nvPr>
+            <p:ph type="sldImg"/>
+          </p:nvPr>
+        </p:nvSpPr>
+        <p:spPr/>
+      </p:sp>
+      <p:sp>
+        <p:nvSpPr>
+          <p:cNvPr id="3" name="Notes Placeholder 2"/>
+          <p:cNvSpPr>
+            <a:spLocks noGrp="1"/>
+          </p:cNvSpPr>
+          <p:nvPr>
+            <p:ph type="body" idx="1"/>
+          </p:nvPr>
+        </p:nvSpPr>
+        <p:spPr/>
+        <p:txBody>
+          <a:bodyPr/>
+          <a:lstStyle/>
+          <a:p>
+            <a:pPr marL="171450" indent="-171450">
+              <a:buFontTx/>
+              <a:buChar char="-"/>
+            </a:pPr>
+            <a:r>
+              <a:rPr lang="en-US" dirty="0"/>
+              <a:t>Conceptually similar to WCF &amp; .NET Remoting</a:t>
+            </a:r>
+          </a:p>
+          <a:p>
+            <a:pPr marL="171450" indent="-171450">
+              <a:buFontTx/>
+              <a:buChar char="-"/>
+            </a:pPr>
+            <a:r>
+              <a:rPr lang="en-US" dirty="0"/>
+              <a:t>We’re contributing to the open source </a:t>
+            </a:r>
+            <a:r>
+              <a:rPr lang="en-US" dirty="0" err="1"/>
+              <a:t>gRPC</a:t>
+            </a:r>
+            <a:r>
+              <a:rPr lang="en-US" dirty="0"/>
+              <a:t> project</a:t>
+            </a:r>
+          </a:p>
+          <a:p>
+            <a:pPr marL="171450" indent="-171450">
+              <a:buFontTx/>
+              <a:buChar char="-"/>
+            </a:pPr>
+            <a:r>
+              <a:rPr lang="en-US" dirty="0"/>
+              <a:t>In PROD, configure TLS (Transport Layer Security) to secure messages</a:t>
+            </a:r>
+          </a:p>
+          <a:p>
+            <a:pPr marL="171450" indent="-171450">
+              <a:buFontTx/>
+              <a:buChar char="-"/>
+            </a:pPr>
+            <a:r>
+              <a:rPr lang="en-US" dirty="0"/>
+              <a:t>*.proto (Protocol Buffers) files</a:t>
+            </a:r>
+          </a:p>
+          <a:p>
+            <a:pPr marL="171450" indent="-171450">
+              <a:buFontTx/>
+              <a:buChar char="-"/>
+            </a:pPr>
+            <a:r>
+              <a:rPr lang="en-US" dirty="0"/>
+              <a:t>Reduced network congestion thanks to binary serialization</a:t>
+            </a:r>
+          </a:p>
+          <a:p>
+            <a:endParaRPr lang="en-US" dirty="0"/>
+          </a:p>
+        </p:txBody>
+      </p:sp>
+      <p:sp>
+        <p:nvSpPr>
+          <p:cNvPr id="4" name="Slide Number Placeholder 3"/>
+          <p:cNvSpPr>
+            <a:spLocks noGrp="1"/>
+          </p:cNvSpPr>
+          <p:nvPr>
+            <p:ph type="sldNum" sz="quarter" idx="5"/>
+          </p:nvPr>
+        </p:nvSpPr>
+        <p:spPr/>
+        <p:txBody>
+          <a:bodyPr/>
+          <a:lstStyle/>
+          <a:p>
+            <a:fld id="{E0AE778D-2A57-4226-B72B-26EA3CA60131}" type="slidenum">
+              <a:rPr lang="en-US" smtClean="0"/>
+              <a:t>15</a:t>
+            </a:fld>
+            <a:endParaRPr lang="en-US"/>
+          </a:p>
+        </p:txBody>
+      </p:sp>
+    </p:spTree>
+    <p:extLst>
+      <p:ext uri="{BB962C8B-B14F-4D97-AF65-F5344CB8AC3E}">
+        <p14:creationId xmlns:p14="http://schemas.microsoft.com/office/powerpoint/2010/main" val="117010616"/>
+      </p:ext>
+    </p:extLst>
+  </p:cSld>
+  <p:clrMapOvr>
+    <a:masterClrMapping/>
+  </p:clrMapOvr>
+</p:notes>
+</file>
+
+<file path=ppt/notesSlides/notesSlide16.xml><?xml version="1.0" encoding="utf-8"?>
+<p:notes xmlns:a="http://schemas.openxmlformats.org/drawingml/2006/main" xmlns:r="http://schemas.openxmlformats.org/officeDocument/2006/relationships" xmlns:p="http://schemas.openxmlformats.org/presentationml/2006/main">
+  <p:cSld>
+    <p:spTree>
+      <p:nvGrpSpPr>
+        <p:cNvPr id="1" name=""/>
+        <p:cNvGrpSpPr/>
+        <p:nvPr/>
+      </p:nvGrpSpPr>
+      <p:grpSpPr>
+        <a:xfrm>
+          <a:off x="0" y="0"/>
+          <a:ext cx="0" cy="0"/>
+          <a:chOff x="0" y="0"/>
+          <a:chExt cx="0" cy="0"/>
+        </a:xfrm>
+      </p:grpSpPr>
+      <p:sp>
+        <p:nvSpPr>
+          <p:cNvPr id="2" name="Slide Image Placeholder 1"/>
+          <p:cNvSpPr>
+            <a:spLocks noGrp="1" noRot="1" noChangeAspect="1"/>
+          </p:cNvSpPr>
+          <p:nvPr>
+            <p:ph type="sldImg"/>
+          </p:nvPr>
+        </p:nvSpPr>
+        <p:spPr/>
+      </p:sp>
+      <p:sp>
+        <p:nvSpPr>
+          <p:cNvPr id="3" name="Notes Placeholder 2"/>
+          <p:cNvSpPr>
+            <a:spLocks noGrp="1"/>
+          </p:cNvSpPr>
+          <p:nvPr>
+            <p:ph type="body" idx="1"/>
+          </p:nvPr>
+        </p:nvSpPr>
+        <p:spPr/>
+        <p:txBody>
+          <a:bodyPr/>
+          <a:lstStyle/>
+          <a:p>
             <a:endParaRPr lang="en-US"/>
           </a:p>
         </p:txBody>
@@ -4915,7 +5180,178 @@
           <a:p>
             <a:fld id="{E0AE778D-2A57-4226-B72B-26EA3CA60131}" type="slidenum">
               <a:rPr lang="en-US" smtClean="0"/>
-              <a:t>15</a:t>
+              <a:t>17</a:t>
+            </a:fld>
+            <a:endParaRPr lang="en-US"/>
+          </a:p>
+        </p:txBody>
+      </p:sp>
+    </p:spTree>
+    <p:extLst>
+      <p:ext uri="{BB962C8B-B14F-4D97-AF65-F5344CB8AC3E}">
+        <p14:creationId xmlns:p14="http://schemas.microsoft.com/office/powerpoint/2010/main" val="250187586"/>
+      </p:ext>
+    </p:extLst>
+  </p:cSld>
+  <p:clrMapOvr>
+    <a:masterClrMapping/>
+  </p:clrMapOvr>
+</p:notes>
+</file>
+
+<file path=ppt/notesSlides/notesSlide17.xml><?xml version="1.0" encoding="utf-8"?>
+<p:notes xmlns:a="http://schemas.openxmlformats.org/drawingml/2006/main" xmlns:r="http://schemas.openxmlformats.org/officeDocument/2006/relationships" xmlns:p="http://schemas.openxmlformats.org/presentationml/2006/main">
+  <p:cSld>
+    <p:spTree>
+      <p:nvGrpSpPr>
+        <p:cNvPr id="1" name=""/>
+        <p:cNvGrpSpPr/>
+        <p:nvPr/>
+      </p:nvGrpSpPr>
+      <p:grpSpPr>
+        <a:xfrm>
+          <a:off x="0" y="0"/>
+          <a:ext cx="0" cy="0"/>
+          <a:chOff x="0" y="0"/>
+          <a:chExt cx="0" cy="0"/>
+        </a:xfrm>
+      </p:grpSpPr>
+      <p:sp>
+        <p:nvSpPr>
+          <p:cNvPr id="2" name="Slide Image Placeholder 1"/>
+          <p:cNvSpPr>
+            <a:spLocks noGrp="1" noRot="1" noChangeAspect="1"/>
+          </p:cNvSpPr>
+          <p:nvPr>
+            <p:ph type="sldImg"/>
+          </p:nvPr>
+        </p:nvSpPr>
+        <p:spPr/>
+      </p:sp>
+      <p:sp>
+        <p:nvSpPr>
+          <p:cNvPr id="3" name="Notes Placeholder 2"/>
+          <p:cNvSpPr>
+            <a:spLocks noGrp="1"/>
+          </p:cNvSpPr>
+          <p:nvPr>
+            <p:ph type="body" idx="1"/>
+          </p:nvPr>
+        </p:nvSpPr>
+        <p:spPr/>
+        <p:txBody>
+          <a:bodyPr/>
+          <a:lstStyle/>
+          <a:p>
+            <a:r>
+              <a:rPr lang="en-US" dirty="0"/>
+              <a:t>New roll-forward behaviors</a:t>
+            </a:r>
+          </a:p>
+        </p:txBody>
+      </p:sp>
+      <p:sp>
+        <p:nvSpPr>
+          <p:cNvPr id="4" name="Slide Number Placeholder 3"/>
+          <p:cNvSpPr>
+            <a:spLocks noGrp="1"/>
+          </p:cNvSpPr>
+          <p:nvPr>
+            <p:ph type="sldNum" sz="quarter" idx="5"/>
+          </p:nvPr>
+        </p:nvSpPr>
+        <p:spPr/>
+        <p:txBody>
+          <a:bodyPr/>
+          <a:lstStyle/>
+          <a:p>
+            <a:fld id="{E0AE778D-2A57-4226-B72B-26EA3CA60131}" type="slidenum">
+              <a:rPr lang="en-US" smtClean="0"/>
+              <a:t>18</a:t>
+            </a:fld>
+            <a:endParaRPr lang="en-US"/>
+          </a:p>
+        </p:txBody>
+      </p:sp>
+    </p:spTree>
+    <p:extLst>
+      <p:ext uri="{BB962C8B-B14F-4D97-AF65-F5344CB8AC3E}">
+        <p14:creationId xmlns:p14="http://schemas.microsoft.com/office/powerpoint/2010/main" val="2064820010"/>
+      </p:ext>
+    </p:extLst>
+  </p:cSld>
+  <p:clrMapOvr>
+    <a:masterClrMapping/>
+  </p:clrMapOvr>
+</p:notes>
+</file>
+
+<file path=ppt/notesSlides/notesSlide18.xml><?xml version="1.0" encoding="utf-8"?>
+<p:notes xmlns:a="http://schemas.openxmlformats.org/drawingml/2006/main" xmlns:r="http://schemas.openxmlformats.org/officeDocument/2006/relationships" xmlns:p="http://schemas.openxmlformats.org/presentationml/2006/main">
+  <p:cSld>
+    <p:spTree>
+      <p:nvGrpSpPr>
+        <p:cNvPr id="1" name=""/>
+        <p:cNvGrpSpPr/>
+        <p:nvPr/>
+      </p:nvGrpSpPr>
+      <p:grpSpPr>
+        <a:xfrm>
+          <a:off x="0" y="0"/>
+          <a:ext cx="0" cy="0"/>
+          <a:chOff x="0" y="0"/>
+          <a:chExt cx="0" cy="0"/>
+        </a:xfrm>
+      </p:grpSpPr>
+      <p:sp>
+        <p:nvSpPr>
+          <p:cNvPr id="2" name="Slide Image Placeholder 1"/>
+          <p:cNvSpPr>
+            <a:spLocks noGrp="1" noRot="1" noChangeAspect="1"/>
+          </p:cNvSpPr>
+          <p:nvPr>
+            <p:ph type="sldImg"/>
+          </p:nvPr>
+        </p:nvSpPr>
+        <p:spPr/>
+      </p:sp>
+      <p:sp>
+        <p:nvSpPr>
+          <p:cNvPr id="3" name="Notes Placeholder 2"/>
+          <p:cNvSpPr>
+            <a:spLocks noGrp="1"/>
+          </p:cNvSpPr>
+          <p:nvPr>
+            <p:ph type="body" idx="1"/>
+          </p:nvPr>
+        </p:nvSpPr>
+        <p:spPr/>
+        <p:txBody>
+          <a:bodyPr/>
+          <a:lstStyle/>
+          <a:p>
+            <a:endParaRPr lang="en-US"/>
+          </a:p>
+        </p:txBody>
+      </p:sp>
+      <p:sp>
+        <p:nvSpPr>
+          <p:cNvPr id="4" name="Slide Number Placeholder 3"/>
+          <p:cNvSpPr>
+            <a:spLocks noGrp="1"/>
+          </p:cNvSpPr>
+          <p:nvPr>
+            <p:ph type="sldNum" sz="quarter" idx="10"/>
+          </p:nvPr>
+        </p:nvSpPr>
+        <p:spPr/>
+        <p:txBody>
+          <a:bodyPr/>
+          <a:lstStyle/>
+          <a:p>
+            <a:fld id="{E0AE778D-2A57-4226-B72B-26EA3CA60131}" type="slidenum">
+              <a:rPr lang="en-US" smtClean="0"/>
+              <a:t>19</a:t>
             </a:fld>
             <a:endParaRPr lang="en-US"/>
           </a:p>
@@ -4978,9 +5414,23 @@
           <a:bodyPr/>
           <a:lstStyle/>
           <a:p>
+            <a:pPr marL="171450" indent="-171450">
+              <a:buFontTx/>
+              <a:buChar char="-"/>
+            </a:pPr>
             <a:r>
               <a:rPr lang="en-US" dirty="0"/>
               <a:t>ASP.NET Core 3.0 built on .NET Standard 2.1</a:t>
+            </a:r>
+          </a:p>
+          <a:p>
+            <a:pPr marL="171450" indent="-171450">
+              <a:buFontTx/>
+              <a:buChar char="-"/>
+            </a:pPr>
+            <a:r>
+              <a:rPr lang="en-US" dirty="0"/>
+              <a:t>.NET Standard is first version to NOT support .NET Framework</a:t>
             </a:r>
           </a:p>
         </p:txBody>
@@ -5354,6 +5804,34 @@
           <a:bodyPr/>
           <a:lstStyle/>
           <a:p>
+            <a:pPr marL="171450" marR="0" lvl="0" indent="-171450" algn="l" defTabSz="914400" rtl="0" eaLnBrk="1" fontAlgn="auto" latinLnBrk="0" hangingPunct="1">
+              <a:lnSpc>
+                <a:spcPct val="100000"/>
+              </a:lnSpc>
+              <a:spcBef>
+                <a:spcPts val="0"/>
+              </a:spcBef>
+              <a:spcAft>
+                <a:spcPts val="0"/>
+              </a:spcAft>
+              <a:buClrTx/>
+              <a:buSzTx/>
+              <a:buFontTx/>
+              <a:buChar char="-"/>
+              <a:tabLst/>
+              <a:defRPr/>
+            </a:pPr>
+            <a:r>
+              <a:rPr lang="en-US" b="1" i="0" dirty="0" err="1"/>
+              <a:t>WebApi.Client</a:t>
+            </a:r>
+            <a:r>
+              <a:rPr lang="en-US" b="0" i="0" dirty="0"/>
+              <a:t>: had a dependency on Json.NET</a:t>
+            </a:r>
+            <a:endParaRPr lang="en-US" b="1" i="0" dirty="0"/>
+          </a:p>
+          <a:p>
             <a:pPr marL="171450" indent="-171450">
               <a:buFontTx/>
               <a:buChar char="-"/>
@@ -5397,8 +5875,12 @@
               <a:t>Social auth</a:t>
             </a:r>
             <a:r>
+              <a:rPr lang="en-US" b="0" i="0" dirty="0"/>
+              <a:t>:</a:t>
+            </a:r>
+            <a:r>
               <a:rPr lang="en-US" b="1" i="1" dirty="0"/>
-              <a:t>: </a:t>
+              <a:t> </a:t>
             </a:r>
             <a:r>
               <a:rPr lang="en-US" b="0" i="0" dirty="0"/>
@@ -13754,10 +14236,52 @@
             <p:ph type="body" sz="quarter" idx="10"/>
           </p:nvPr>
         </p:nvSpPr>
-        <p:spPr/>
+        <p:spPr>
+          <a:xfrm>
+            <a:off x="269239" y="1189177"/>
+            <a:ext cx="11653523" cy="3382529"/>
+          </a:xfrm>
+        </p:spPr>
         <p:txBody>
           <a:bodyPr/>
           <a:lstStyle/>
+          <a:p>
+            <a:r>
+              <a:rPr lang="en-US" dirty="0" err="1"/>
+              <a:t>httprepl</a:t>
+            </a:r>
+            <a:endParaRPr lang="en-US" dirty="0"/>
+          </a:p>
+          <a:p>
+            <a:r>
+              <a:rPr lang="en-US" dirty="0"/>
+              <a:t>set base </a:t>
+            </a:r>
+            <a:r>
+              <a:rPr lang="en-US" dirty="0">
+                <a:hlinkClick r:id="rId3"/>
+              </a:rPr>
+              <a:t>https://localhost:5001</a:t>
+            </a:r>
+            <a:endParaRPr lang="en-US" dirty="0"/>
+          </a:p>
+          <a:p>
+            <a:r>
+              <a:rPr lang="en-US" dirty="0"/>
+              <a:t>cd </a:t>
+            </a:r>
+            <a:r>
+              <a:rPr lang="en-US" dirty="0" err="1"/>
+              <a:t>weatherforecast</a:t>
+            </a:r>
+            <a:endParaRPr lang="en-US" dirty="0"/>
+          </a:p>
+          <a:p>
+            <a:r>
+              <a:rPr lang="en-US" dirty="0"/>
+              <a:t>GET Chicago</a:t>
+            </a:r>
+          </a:p>
           <a:p>
             <a:endParaRPr lang="en-US" dirty="0"/>
           </a:p>
@@ -13840,12 +14364,656 @@
             <p:ph type="body" sz="quarter" idx="10"/>
           </p:nvPr>
         </p:nvSpPr>
-        <p:spPr/>
+        <p:spPr>
+          <a:xfrm>
+            <a:off x="269239" y="1189177"/>
+            <a:ext cx="11653523" cy="5539978"/>
+          </a:xfrm>
+        </p:spPr>
         <p:txBody>
           <a:bodyPr/>
           <a:lstStyle/>
           <a:p>
-            <a:endParaRPr lang="en-US" dirty="0"/>
+            <a:pPr marL="0" indent="0">
+              <a:buNone/>
+            </a:pPr>
+            <a:r>
+              <a:rPr lang="en-US" sz="2000" dirty="0">
+                <a:solidFill>
+                  <a:srgbClr val="000000"/>
+                </a:solidFill>
+                <a:latin typeface="Consolas" panose="020B0609020204030204" pitchFamily="49" charset="0"/>
+              </a:rPr>
+              <a:t>[</a:t>
+            </a:r>
+            <a:r>
+              <a:rPr lang="en-US" sz="2000" dirty="0" err="1">
+                <a:solidFill>
+                  <a:srgbClr val="000000"/>
+                </a:solidFill>
+                <a:latin typeface="Consolas" panose="020B0609020204030204" pitchFamily="49" charset="0"/>
+              </a:rPr>
+              <a:t>ApiController</a:t>
+            </a:r>
+            <a:r>
+              <a:rPr lang="en-US" sz="2000" dirty="0">
+                <a:solidFill>
+                  <a:srgbClr val="000000"/>
+                </a:solidFill>
+                <a:latin typeface="Consolas" panose="020B0609020204030204" pitchFamily="49" charset="0"/>
+              </a:rPr>
+              <a:t>]</a:t>
+            </a:r>
+          </a:p>
+          <a:p>
+            <a:pPr marL="0" indent="0">
+              <a:buNone/>
+            </a:pPr>
+            <a:r>
+              <a:rPr lang="en-US" sz="2000" dirty="0">
+                <a:solidFill>
+                  <a:srgbClr val="000000"/>
+                </a:solidFill>
+                <a:latin typeface="Consolas" panose="020B0609020204030204" pitchFamily="49" charset="0"/>
+              </a:rPr>
+              <a:t>[Route(</a:t>
+            </a:r>
+            <a:r>
+              <a:rPr lang="en-US" sz="2000" dirty="0">
+                <a:solidFill>
+                  <a:srgbClr val="A31515"/>
+                </a:solidFill>
+                <a:latin typeface="Consolas" panose="020B0609020204030204" pitchFamily="49" charset="0"/>
+              </a:rPr>
+              <a:t>"[controller]"</a:t>
+            </a:r>
+            <a:r>
+              <a:rPr lang="en-US" sz="2000" dirty="0">
+                <a:solidFill>
+                  <a:srgbClr val="000000"/>
+                </a:solidFill>
+                <a:latin typeface="Consolas" panose="020B0609020204030204" pitchFamily="49" charset="0"/>
+              </a:rPr>
+              <a:t>)]</a:t>
+            </a:r>
+          </a:p>
+          <a:p>
+            <a:pPr marL="0" indent="0">
+              <a:buNone/>
+            </a:pPr>
+            <a:r>
+              <a:rPr lang="en-US" sz="2000" dirty="0">
+                <a:solidFill>
+                  <a:srgbClr val="0000FF"/>
+                </a:solidFill>
+                <a:latin typeface="Consolas" panose="020B0609020204030204" pitchFamily="49" charset="0"/>
+              </a:rPr>
+              <a:t>public</a:t>
+            </a:r>
+            <a:r>
+              <a:rPr lang="en-US" sz="2000" dirty="0">
+                <a:solidFill>
+                  <a:srgbClr val="000000"/>
+                </a:solidFill>
+                <a:latin typeface="Consolas" panose="020B0609020204030204" pitchFamily="49" charset="0"/>
+              </a:rPr>
+              <a:t> </a:t>
+            </a:r>
+            <a:r>
+              <a:rPr lang="en-US" sz="2000" dirty="0">
+                <a:solidFill>
+                  <a:srgbClr val="0000FF"/>
+                </a:solidFill>
+                <a:latin typeface="Consolas" panose="020B0609020204030204" pitchFamily="49" charset="0"/>
+              </a:rPr>
+              <a:t>class</a:t>
+            </a:r>
+            <a:r>
+              <a:rPr lang="en-US" sz="2000" dirty="0">
+                <a:solidFill>
+                  <a:srgbClr val="000000"/>
+                </a:solidFill>
+                <a:latin typeface="Consolas" panose="020B0609020204030204" pitchFamily="49" charset="0"/>
+              </a:rPr>
+              <a:t> </a:t>
+            </a:r>
+            <a:r>
+              <a:rPr lang="en-US" sz="2000" dirty="0" err="1">
+                <a:solidFill>
+                  <a:srgbClr val="2B91AF"/>
+                </a:solidFill>
+                <a:latin typeface="Consolas" panose="020B0609020204030204" pitchFamily="49" charset="0"/>
+              </a:rPr>
+              <a:t>WeatherForecastController</a:t>
+            </a:r>
+            <a:r>
+              <a:rPr lang="en-US" sz="2000" dirty="0">
+                <a:solidFill>
+                  <a:srgbClr val="000000"/>
+                </a:solidFill>
+                <a:latin typeface="Consolas" panose="020B0609020204030204" pitchFamily="49" charset="0"/>
+              </a:rPr>
+              <a:t> : </a:t>
+            </a:r>
+            <a:r>
+              <a:rPr lang="en-US" sz="2000" dirty="0" err="1">
+                <a:solidFill>
+                  <a:srgbClr val="000000"/>
+                </a:solidFill>
+                <a:latin typeface="Consolas" panose="020B0609020204030204" pitchFamily="49" charset="0"/>
+              </a:rPr>
+              <a:t>ControllerBase</a:t>
+            </a:r>
+            <a:endParaRPr lang="en-US" sz="2000" dirty="0">
+              <a:solidFill>
+                <a:srgbClr val="000000"/>
+              </a:solidFill>
+              <a:latin typeface="Consolas" panose="020B0609020204030204" pitchFamily="49" charset="0"/>
+            </a:endParaRPr>
+          </a:p>
+          <a:p>
+            <a:pPr marL="0" indent="0">
+              <a:buNone/>
+            </a:pPr>
+            <a:r>
+              <a:rPr lang="en-US" sz="2000" dirty="0">
+                <a:solidFill>
+                  <a:srgbClr val="000000"/>
+                </a:solidFill>
+                <a:latin typeface="Consolas" panose="020B0609020204030204" pitchFamily="49" charset="0"/>
+              </a:rPr>
+              <a:t>{</a:t>
+            </a:r>
+          </a:p>
+          <a:p>
+            <a:pPr marL="0" indent="0">
+              <a:buNone/>
+            </a:pPr>
+            <a:r>
+              <a:rPr lang="en-US" sz="2000" dirty="0">
+                <a:solidFill>
+                  <a:srgbClr val="000000"/>
+                </a:solidFill>
+                <a:latin typeface="Consolas" panose="020B0609020204030204" pitchFamily="49" charset="0"/>
+              </a:rPr>
+              <a:t>    [</a:t>
+            </a:r>
+            <a:r>
+              <a:rPr lang="en-US" sz="2000" dirty="0" err="1">
+                <a:solidFill>
+                  <a:srgbClr val="000000"/>
+                </a:solidFill>
+                <a:latin typeface="Consolas" panose="020B0609020204030204" pitchFamily="49" charset="0"/>
+              </a:rPr>
+              <a:t>HttpGet</a:t>
+            </a:r>
+            <a:r>
+              <a:rPr lang="en-US" sz="2000" dirty="0">
+                <a:solidFill>
+                  <a:srgbClr val="000000"/>
+                </a:solidFill>
+                <a:latin typeface="Consolas" panose="020B0609020204030204" pitchFamily="49" charset="0"/>
+              </a:rPr>
+              <a:t>(</a:t>
+            </a:r>
+            <a:r>
+              <a:rPr lang="en-US" sz="2000" dirty="0">
+                <a:solidFill>
+                  <a:srgbClr val="A31515"/>
+                </a:solidFill>
+                <a:latin typeface="Consolas" panose="020B0609020204030204" pitchFamily="49" charset="0"/>
+              </a:rPr>
+              <a:t>"{city}"</a:t>
+            </a:r>
+            <a:r>
+              <a:rPr lang="en-US" sz="2000" dirty="0">
+                <a:solidFill>
+                  <a:srgbClr val="000000"/>
+                </a:solidFill>
+                <a:latin typeface="Consolas" panose="020B0609020204030204" pitchFamily="49" charset="0"/>
+              </a:rPr>
+              <a:t>)]</a:t>
+            </a:r>
+          </a:p>
+          <a:p>
+            <a:pPr marL="0" indent="0">
+              <a:buNone/>
+            </a:pPr>
+            <a:r>
+              <a:rPr lang="en-US" sz="2000" dirty="0">
+                <a:solidFill>
+                  <a:srgbClr val="0000FF"/>
+                </a:solidFill>
+                <a:latin typeface="Consolas" panose="020B0609020204030204" pitchFamily="49" charset="0"/>
+              </a:rPr>
+              <a:t>    public</a:t>
+            </a:r>
+            <a:r>
+              <a:rPr lang="en-US" sz="2000" dirty="0">
+                <a:solidFill>
+                  <a:srgbClr val="000000"/>
+                </a:solidFill>
+                <a:latin typeface="Consolas" panose="020B0609020204030204" pitchFamily="49" charset="0"/>
+              </a:rPr>
+              <a:t> </a:t>
+            </a:r>
+            <a:r>
+              <a:rPr lang="en-US" sz="2000" dirty="0" err="1">
+                <a:solidFill>
+                  <a:srgbClr val="000000"/>
+                </a:solidFill>
+                <a:latin typeface="Consolas" panose="020B0609020204030204" pitchFamily="49" charset="0"/>
+              </a:rPr>
+              <a:t>WeatherForecast</a:t>
+            </a:r>
+            <a:r>
+              <a:rPr lang="en-US" sz="2000" dirty="0">
+                <a:solidFill>
+                  <a:srgbClr val="000000"/>
+                </a:solidFill>
+                <a:latin typeface="Consolas" panose="020B0609020204030204" pitchFamily="49" charset="0"/>
+              </a:rPr>
+              <a:t> Get(</a:t>
+            </a:r>
+            <a:r>
+              <a:rPr lang="en-US" sz="2000" dirty="0">
+                <a:solidFill>
+                  <a:srgbClr val="0000FF"/>
+                </a:solidFill>
+                <a:latin typeface="Consolas" panose="020B0609020204030204" pitchFamily="49" charset="0"/>
+              </a:rPr>
+              <a:t>string</a:t>
+            </a:r>
+            <a:r>
+              <a:rPr lang="en-US" sz="2000" dirty="0">
+                <a:solidFill>
+                  <a:srgbClr val="000000"/>
+                </a:solidFill>
+                <a:latin typeface="Consolas" panose="020B0609020204030204" pitchFamily="49" charset="0"/>
+              </a:rPr>
+              <a:t> city)</a:t>
+            </a:r>
+          </a:p>
+          <a:p>
+            <a:pPr marL="0" indent="0">
+              <a:buNone/>
+            </a:pPr>
+            <a:r>
+              <a:rPr lang="en-US" sz="2000" dirty="0">
+                <a:solidFill>
+                  <a:srgbClr val="000000"/>
+                </a:solidFill>
+                <a:latin typeface="Consolas" panose="020B0609020204030204" pitchFamily="49" charset="0"/>
+              </a:rPr>
+              <a:t>    {</a:t>
+            </a:r>
+          </a:p>
+          <a:p>
+            <a:pPr marL="0" indent="0">
+              <a:buNone/>
+            </a:pPr>
+            <a:r>
+              <a:rPr lang="en-US" sz="2000" dirty="0">
+                <a:solidFill>
+                  <a:srgbClr val="000000"/>
+                </a:solidFill>
+                <a:latin typeface="Consolas" panose="020B0609020204030204" pitchFamily="49" charset="0"/>
+              </a:rPr>
+              <a:t>        </a:t>
+            </a:r>
+            <a:r>
+              <a:rPr lang="en-US" sz="2000" dirty="0">
+                <a:solidFill>
+                  <a:srgbClr val="0000FF"/>
+                </a:solidFill>
+                <a:latin typeface="Consolas" panose="020B0609020204030204" pitchFamily="49" charset="0"/>
+              </a:rPr>
+              <a:t>if</a:t>
+            </a:r>
+            <a:r>
+              <a:rPr lang="en-US" sz="2000" dirty="0">
+                <a:solidFill>
+                  <a:srgbClr val="000000"/>
+                </a:solidFill>
+                <a:latin typeface="Consolas" panose="020B0609020204030204" pitchFamily="49" charset="0"/>
+              </a:rPr>
+              <a:t> (!</a:t>
+            </a:r>
+            <a:r>
+              <a:rPr lang="en-US" sz="2000" dirty="0" err="1">
+                <a:solidFill>
+                  <a:srgbClr val="0000FF"/>
+                </a:solidFill>
+                <a:latin typeface="Consolas" panose="020B0609020204030204" pitchFamily="49" charset="0"/>
+              </a:rPr>
+              <a:t>string</a:t>
+            </a:r>
+            <a:r>
+              <a:rPr lang="en-US" sz="2000" dirty="0" err="1">
+                <a:solidFill>
+                  <a:srgbClr val="000000"/>
+                </a:solidFill>
+                <a:latin typeface="Consolas" panose="020B0609020204030204" pitchFamily="49" charset="0"/>
+              </a:rPr>
+              <a:t>.Equals</a:t>
+            </a:r>
+            <a:r>
+              <a:rPr lang="en-US" sz="2000" dirty="0">
+                <a:solidFill>
+                  <a:srgbClr val="000000"/>
+                </a:solidFill>
+                <a:latin typeface="Consolas" panose="020B0609020204030204" pitchFamily="49" charset="0"/>
+              </a:rPr>
+              <a:t>(city?.</a:t>
+            </a:r>
+            <a:r>
+              <a:rPr lang="en-US" sz="2000" dirty="0" err="1">
+                <a:solidFill>
+                  <a:srgbClr val="000000"/>
+                </a:solidFill>
+                <a:latin typeface="Consolas" panose="020B0609020204030204" pitchFamily="49" charset="0"/>
+              </a:rPr>
+              <a:t>TrimEnd</a:t>
+            </a:r>
+            <a:r>
+              <a:rPr lang="en-US" sz="2000" dirty="0">
+                <a:solidFill>
+                  <a:srgbClr val="000000"/>
+                </a:solidFill>
+                <a:latin typeface="Consolas" panose="020B0609020204030204" pitchFamily="49" charset="0"/>
+              </a:rPr>
+              <a:t>(), </a:t>
+            </a:r>
+            <a:r>
+              <a:rPr lang="en-US" sz="2000" dirty="0">
+                <a:solidFill>
+                  <a:srgbClr val="A31515"/>
+                </a:solidFill>
+                <a:latin typeface="Consolas" panose="020B0609020204030204" pitchFamily="49" charset="0"/>
+              </a:rPr>
+              <a:t>"Redmond"</a:t>
+            </a:r>
+            <a:r>
+              <a:rPr lang="en-US" sz="2000" dirty="0">
+                <a:solidFill>
+                  <a:srgbClr val="000000"/>
+                </a:solidFill>
+                <a:latin typeface="Consolas" panose="020B0609020204030204" pitchFamily="49" charset="0"/>
+              </a:rPr>
+              <a:t>, </a:t>
+            </a:r>
+          </a:p>
+          <a:p>
+            <a:pPr marL="0" indent="0">
+              <a:buNone/>
+            </a:pPr>
+            <a:r>
+              <a:rPr lang="en-US" sz="2000" dirty="0">
+                <a:solidFill>
+                  <a:srgbClr val="000000"/>
+                </a:solidFill>
+                <a:latin typeface="Consolas" panose="020B0609020204030204" pitchFamily="49" charset="0"/>
+              </a:rPr>
+              <a:t>            </a:t>
+            </a:r>
+            <a:r>
+              <a:rPr lang="en-US" sz="2000" dirty="0" err="1">
+                <a:solidFill>
+                  <a:srgbClr val="000000"/>
+                </a:solidFill>
+                <a:latin typeface="Consolas" panose="020B0609020204030204" pitchFamily="49" charset="0"/>
+              </a:rPr>
+              <a:t>StringComparison.OrdinalIgnoreCase</a:t>
+            </a:r>
+            <a:r>
+              <a:rPr lang="en-US" sz="2000" dirty="0">
+                <a:solidFill>
+                  <a:srgbClr val="000000"/>
+                </a:solidFill>
+                <a:latin typeface="Consolas" panose="020B0609020204030204" pitchFamily="49" charset="0"/>
+              </a:rPr>
+              <a:t>))</a:t>
+            </a:r>
+          </a:p>
+          <a:p>
+            <a:pPr marL="0" indent="0">
+              <a:buNone/>
+            </a:pPr>
+            <a:r>
+              <a:rPr lang="en-US" sz="2000" dirty="0">
+                <a:solidFill>
+                  <a:srgbClr val="000000"/>
+                </a:solidFill>
+                <a:latin typeface="Consolas" panose="020B0609020204030204" pitchFamily="49" charset="0"/>
+              </a:rPr>
+              <a:t>        {</a:t>
+            </a:r>
+          </a:p>
+          <a:p>
+            <a:pPr marL="0" indent="0">
+              <a:buNone/>
+            </a:pPr>
+            <a:r>
+              <a:rPr lang="en-US" sz="2000" dirty="0">
+                <a:solidFill>
+                  <a:srgbClr val="000000"/>
+                </a:solidFill>
+                <a:latin typeface="Consolas" panose="020B0609020204030204" pitchFamily="49" charset="0"/>
+              </a:rPr>
+              <a:t>            </a:t>
+            </a:r>
+            <a:r>
+              <a:rPr lang="en-US" sz="2000" dirty="0">
+                <a:solidFill>
+                  <a:srgbClr val="0000FF"/>
+                </a:solidFill>
+                <a:latin typeface="Consolas" panose="020B0609020204030204" pitchFamily="49" charset="0"/>
+              </a:rPr>
+              <a:t>throw</a:t>
+            </a:r>
+            <a:r>
+              <a:rPr lang="en-US" sz="2000" dirty="0">
+                <a:solidFill>
+                  <a:srgbClr val="000000"/>
+                </a:solidFill>
+                <a:latin typeface="Consolas" panose="020B0609020204030204" pitchFamily="49" charset="0"/>
+              </a:rPr>
+              <a:t> </a:t>
+            </a:r>
+            <a:r>
+              <a:rPr lang="en-US" sz="2000" dirty="0">
+                <a:solidFill>
+                  <a:srgbClr val="0000FF"/>
+                </a:solidFill>
+                <a:latin typeface="Consolas" panose="020B0609020204030204" pitchFamily="49" charset="0"/>
+              </a:rPr>
+              <a:t>new</a:t>
+            </a:r>
+            <a:r>
+              <a:rPr lang="en-US" sz="2000" dirty="0">
+                <a:solidFill>
+                  <a:srgbClr val="000000"/>
+                </a:solidFill>
+                <a:latin typeface="Consolas" panose="020B0609020204030204" pitchFamily="49" charset="0"/>
+              </a:rPr>
+              <a:t> </a:t>
+            </a:r>
+            <a:r>
+              <a:rPr lang="en-US" sz="2000" dirty="0" err="1">
+                <a:solidFill>
+                  <a:srgbClr val="000000"/>
+                </a:solidFill>
+                <a:latin typeface="Consolas" panose="020B0609020204030204" pitchFamily="49" charset="0"/>
+              </a:rPr>
+              <a:t>ArgumentException</a:t>
+            </a:r>
+            <a:r>
+              <a:rPr lang="en-US" sz="2000" dirty="0">
+                <a:solidFill>
+                  <a:srgbClr val="000000"/>
+                </a:solidFill>
+                <a:latin typeface="Consolas" panose="020B0609020204030204" pitchFamily="49" charset="0"/>
+              </a:rPr>
+              <a:t>(</a:t>
+            </a:r>
+          </a:p>
+          <a:p>
+            <a:pPr marL="0" indent="0">
+              <a:buNone/>
+            </a:pPr>
+            <a:r>
+              <a:rPr lang="en-US" sz="2000" dirty="0">
+                <a:solidFill>
+                  <a:srgbClr val="000000"/>
+                </a:solidFill>
+                <a:latin typeface="Consolas" panose="020B0609020204030204" pitchFamily="49" charset="0"/>
+              </a:rPr>
+              <a:t>                </a:t>
+            </a:r>
+            <a:r>
+              <a:rPr lang="en-US" sz="2000" dirty="0">
+                <a:solidFill>
+                  <a:srgbClr val="A31515"/>
+                </a:solidFill>
+                <a:latin typeface="Consolas" panose="020B0609020204030204" pitchFamily="49" charset="0"/>
+              </a:rPr>
+              <a:t>$"Weather forecast unavailable for </a:t>
+            </a:r>
+            <a:r>
+              <a:rPr lang="en-US" sz="2000" dirty="0">
+                <a:solidFill>
+                  <a:srgbClr val="000000"/>
+                </a:solidFill>
+                <a:latin typeface="Consolas" panose="020B0609020204030204" pitchFamily="49" charset="0"/>
+              </a:rPr>
+              <a:t>{city}</a:t>
+            </a:r>
+            <a:r>
+              <a:rPr lang="en-US" sz="2000" dirty="0">
+                <a:solidFill>
+                  <a:srgbClr val="A31515"/>
+                </a:solidFill>
+                <a:latin typeface="Consolas" panose="020B0609020204030204" pitchFamily="49" charset="0"/>
+              </a:rPr>
+              <a:t>."</a:t>
+            </a:r>
+            <a:r>
+              <a:rPr lang="en-US" sz="2000" dirty="0">
+                <a:solidFill>
+                  <a:srgbClr val="000000"/>
+                </a:solidFill>
+                <a:latin typeface="Consolas" panose="020B0609020204030204" pitchFamily="49" charset="0"/>
+              </a:rPr>
+              <a:t>, </a:t>
+            </a:r>
+            <a:r>
+              <a:rPr lang="en-US" sz="2000" dirty="0" err="1">
+                <a:solidFill>
+                  <a:srgbClr val="000000"/>
+                </a:solidFill>
+                <a:latin typeface="Consolas" panose="020B0609020204030204" pitchFamily="49" charset="0"/>
+              </a:rPr>
+              <a:t>nameof</a:t>
+            </a:r>
+            <a:r>
+              <a:rPr lang="en-US" sz="2000" dirty="0">
+                <a:solidFill>
+                  <a:srgbClr val="000000"/>
+                </a:solidFill>
+                <a:latin typeface="Consolas" panose="020B0609020204030204" pitchFamily="49" charset="0"/>
+              </a:rPr>
+              <a:t>(city));</a:t>
+            </a:r>
+          </a:p>
+          <a:p>
+            <a:pPr marL="0" indent="0">
+              <a:buNone/>
+            </a:pPr>
+            <a:r>
+              <a:rPr lang="en-US" sz="2000" dirty="0">
+                <a:solidFill>
+                  <a:srgbClr val="000000"/>
+                </a:solidFill>
+                <a:latin typeface="Consolas" panose="020B0609020204030204" pitchFamily="49" charset="0"/>
+              </a:rPr>
+              <a:t>        }</a:t>
+            </a:r>
+          </a:p>
+          <a:p>
+            <a:pPr marL="0" indent="0">
+              <a:buNone/>
+            </a:pPr>
+            <a:endParaRPr lang="en-US" sz="2000" dirty="0">
+              <a:solidFill>
+                <a:srgbClr val="000000"/>
+              </a:solidFill>
+              <a:latin typeface="Consolas" panose="020B0609020204030204" pitchFamily="49" charset="0"/>
+            </a:endParaRPr>
+          </a:p>
+          <a:p>
+            <a:pPr marL="0" indent="0">
+              <a:buNone/>
+            </a:pPr>
+            <a:r>
+              <a:rPr lang="en-US" sz="2000" dirty="0">
+                <a:solidFill>
+                  <a:srgbClr val="000000"/>
+                </a:solidFill>
+                <a:latin typeface="Consolas" panose="020B0609020204030204" pitchFamily="49" charset="0"/>
+              </a:rPr>
+              <a:t>        </a:t>
+            </a:r>
+            <a:r>
+              <a:rPr lang="en-US" sz="2000" dirty="0">
+                <a:solidFill>
+                  <a:srgbClr val="0000FF"/>
+                </a:solidFill>
+                <a:latin typeface="Consolas" panose="020B0609020204030204" pitchFamily="49" charset="0"/>
+              </a:rPr>
+              <a:t>return</a:t>
+            </a:r>
+            <a:r>
+              <a:rPr lang="en-US" sz="2000" dirty="0">
+                <a:solidFill>
+                  <a:srgbClr val="000000"/>
+                </a:solidFill>
+                <a:latin typeface="Consolas" panose="020B0609020204030204" pitchFamily="49" charset="0"/>
+              </a:rPr>
+              <a:t> </a:t>
+            </a:r>
+            <a:r>
+              <a:rPr lang="en-US" sz="2000" dirty="0" err="1">
+                <a:solidFill>
+                  <a:srgbClr val="000000"/>
+                </a:solidFill>
+                <a:latin typeface="Consolas" panose="020B0609020204030204" pitchFamily="49" charset="0"/>
+              </a:rPr>
+              <a:t>GetWeather</a:t>
+            </a:r>
+            <a:r>
+              <a:rPr lang="en-US" sz="2000" dirty="0">
+                <a:solidFill>
+                  <a:srgbClr val="000000"/>
+                </a:solidFill>
+                <a:latin typeface="Consolas" panose="020B0609020204030204" pitchFamily="49" charset="0"/>
+              </a:rPr>
+              <a:t>().First();</a:t>
+            </a:r>
+          </a:p>
+          <a:p>
+            <a:pPr marL="0" indent="0">
+              <a:buNone/>
+            </a:pPr>
+            <a:r>
+              <a:rPr lang="en-US" sz="2000" dirty="0">
+                <a:solidFill>
+                  <a:srgbClr val="000000"/>
+                </a:solidFill>
+                <a:latin typeface="Consolas" panose="020B0609020204030204" pitchFamily="49" charset="0"/>
+              </a:rPr>
+              <a:t>    }</a:t>
+            </a:r>
+            <a:endParaRPr lang="en-US" sz="2000" dirty="0"/>
           </a:p>
         </p:txBody>
       </p:sp>
@@ -13877,6 +15045,88 @@
           </a:p>
         </p:txBody>
       </p:sp>
+      <p:sp>
+        <p:nvSpPr>
+          <p:cNvPr id="4" name="Rectangle 3">
+            <a:extLst>
+              <a:ext uri="{FF2B5EF4-FFF2-40B4-BE49-F238E27FC236}">
+                <a16:creationId xmlns:a16="http://schemas.microsoft.com/office/drawing/2014/main" id="{92DF6D9C-8714-4FD7-9CBC-2DC295BEA6B5}"/>
+              </a:ext>
+            </a:extLst>
+          </p:cNvPr>
+          <p:cNvSpPr/>
+          <p:nvPr/>
+        </p:nvSpPr>
+        <p:spPr bwMode="auto">
+          <a:xfrm>
+            <a:off x="2011843" y="4603835"/>
+            <a:ext cx="8886680" cy="672406"/>
+          </a:xfrm>
+          <a:prstGeom prst="rect">
+            <a:avLst/>
+          </a:prstGeom>
+          <a:noFill/>
+          <a:ln w="38100">
+            <a:solidFill>
+              <a:schemeClr val="tx2"/>
+            </a:solidFill>
+            <a:headEnd type="none" w="med" len="med"/>
+            <a:tailEnd type="none" w="med" len="med"/>
+          </a:ln>
+          <a:effectLst/>
+        </p:spPr>
+        <p:style>
+          <a:lnRef idx="1">
+            <a:schemeClr val="accent2"/>
+          </a:lnRef>
+          <a:fillRef idx="3">
+            <a:schemeClr val="accent2"/>
+          </a:fillRef>
+          <a:effectRef idx="2">
+            <a:schemeClr val="accent2"/>
+          </a:effectRef>
+          <a:fontRef idx="minor">
+            <a:schemeClr val="lt1"/>
+          </a:fontRef>
+        </p:style>
+        <p:txBody>
+          <a:bodyPr rot="0" spcFirstLastPara="0" vertOverflow="overflow" horzOverflow="overflow" vert="horz" wrap="square" lIns="182880" tIns="146304" rIns="182880" bIns="146304" numCol="1" spcCol="0" rtlCol="0" fromWordArt="0" anchor="t" anchorCtr="0" forceAA="0" compatLnSpc="1">
+            <a:prstTxWarp prst="textNoShape">
+              <a:avLst/>
+            </a:prstTxWarp>
+            <a:noAutofit/>
+          </a:bodyPr>
+          <a:lstStyle/>
+          <a:p>
+            <a:pPr algn="ctr" defTabSz="932472" fontAlgn="base">
+              <a:lnSpc>
+                <a:spcPct val="90000"/>
+              </a:lnSpc>
+              <a:spcBef>
+                <a:spcPct val="0"/>
+              </a:spcBef>
+              <a:spcAft>
+                <a:spcPct val="0"/>
+              </a:spcAft>
+            </a:pPr>
+            <a:endParaRPr lang="en-US" sz="2400" dirty="0" err="1">
+              <a:gradFill>
+                <a:gsLst>
+                  <a:gs pos="0">
+                    <a:srgbClr val="FFFFFF"/>
+                  </a:gs>
+                  <a:gs pos="100000">
+                    <a:srgbClr val="FFFFFF"/>
+                  </a:gs>
+                </a:gsLst>
+                <a:lin ang="5400000" scaled="0"/>
+              </a:gradFill>
+              <a:ea typeface="Segoe UI" pitchFamily="34" charset="0"/>
+              <a:cs typeface="Segoe UI" pitchFamily="34" charset="0"/>
+            </a:endParaRPr>
+          </a:p>
+        </p:txBody>
+      </p:sp>
     </p:spTree>
     <p:extLst>
       <p:ext uri="{BB962C8B-B14F-4D97-AF65-F5344CB8AC3E}">
@@ -13890,10 +15140,1974 @@
   <p:transition>
     <p:fade/>
   </p:transition>
+  <p:timing>
+    <p:tnLst>
+      <p:par>
+        <p:cTn id="1" dur="indefinite" restart="never" nodeType="tmRoot">
+          <p:childTnLst>
+            <p:seq concurrent="1" nextAc="seek">
+              <p:cTn id="2" dur="indefinite" nodeType="mainSeq">
+                <p:childTnLst>
+                  <p:par>
+                    <p:cTn id="3" fill="hold">
+                      <p:stCondLst>
+                        <p:cond delay="indefinite"/>
+                      </p:stCondLst>
+                      <p:childTnLst>
+                        <p:par>
+                          <p:cTn id="4" fill="hold">
+                            <p:stCondLst>
+                              <p:cond delay="0"/>
+                            </p:stCondLst>
+                            <p:childTnLst>
+                              <p:par>
+                                <p:cTn id="5" presetID="1" presetClass="entr" presetSubtype="0" fill="hold" grpId="0" nodeType="clickEffect">
+                                  <p:stCondLst>
+                                    <p:cond delay="0"/>
+                                  </p:stCondLst>
+                                  <p:childTnLst>
+                                    <p:set>
+                                      <p:cBhvr>
+                                        <p:cTn id="6" dur="1" fill="hold">
+                                          <p:stCondLst>
+                                            <p:cond delay="0"/>
+                                          </p:stCondLst>
+                                        </p:cTn>
+                                        <p:tgtEl>
+                                          <p:spTgt spid="4"/>
+                                        </p:tgtEl>
+                                        <p:attrNameLst>
+                                          <p:attrName>style.visibility</p:attrName>
+                                        </p:attrNameLst>
+                                      </p:cBhvr>
+                                      <p:to>
+                                        <p:strVal val="visible"/>
+                                      </p:to>
+                                    </p:set>
+                                  </p:childTnLst>
+                                </p:cTn>
+                              </p:par>
+                              <p:par>
+                                <p:cTn id="7" presetID="26" presetClass="emph" presetSubtype="0" fill="hold" grpId="1" nodeType="withEffect">
+                                  <p:stCondLst>
+                                    <p:cond delay="0"/>
+                                  </p:stCondLst>
+                                  <p:childTnLst>
+                                    <p:animEffect transition="out" filter="fade">
+                                      <p:cBhvr>
+                                        <p:cTn id="8" dur="500" tmFilter="0, 0; .2, .5; .8, .5; 1, 0"/>
+                                        <p:tgtEl>
+                                          <p:spTgt spid="4"/>
+                                        </p:tgtEl>
+                                      </p:cBhvr>
+                                    </p:animEffect>
+                                    <p:animScale>
+                                      <p:cBhvr>
+                                        <p:cTn id="9" dur="250" autoRev="1" fill="hold"/>
+                                        <p:tgtEl>
+                                          <p:spTgt spid="4"/>
+                                        </p:tgtEl>
+                                      </p:cBhvr>
+                                      <p:by x="105000" y="105000"/>
+                                    </p:animScale>
+                                  </p:childTnLst>
+                                </p:cTn>
+                              </p:par>
+                            </p:childTnLst>
+                          </p:cTn>
+                        </p:par>
+                      </p:childTnLst>
+                    </p:cTn>
+                  </p:par>
+                </p:childTnLst>
+              </p:cTn>
+              <p:prevCondLst>
+                <p:cond evt="onPrev" delay="0">
+                  <p:tgtEl>
+                    <p:sldTgt/>
+                  </p:tgtEl>
+                </p:cond>
+              </p:prevCondLst>
+              <p:nextCondLst>
+                <p:cond evt="onNext" delay="0">
+                  <p:tgtEl>
+                    <p:sldTgt/>
+                  </p:tgtEl>
+                </p:cond>
+              </p:nextCondLst>
+            </p:seq>
+          </p:childTnLst>
+        </p:cTn>
+      </p:par>
+    </p:tnLst>
+    <p:bldLst>
+      <p:bldP spid="4" grpId="0" animBg="1"/>
+      <p:bldP spid="4" grpId="1" animBg="1"/>
+    </p:bldLst>
+  </p:timing>
 </p:sld>
 </file>
 
 <file path=ppt/slides/slide13.xml><?xml version="1.0" encoding="utf-8"?>
+<p:sld xmlns:a="http://schemas.openxmlformats.org/drawingml/2006/main" xmlns:r="http://schemas.openxmlformats.org/officeDocument/2006/relationships" xmlns:p="http://schemas.openxmlformats.org/presentationml/2006/main">
+  <p:cSld>
+    <p:spTree>
+      <p:nvGrpSpPr>
+        <p:cNvPr id="1" name=""/>
+        <p:cNvGrpSpPr/>
+        <p:nvPr/>
+      </p:nvGrpSpPr>
+      <p:grpSpPr>
+        <a:xfrm>
+          <a:off x="0" y="0"/>
+          <a:ext cx="0" cy="0"/>
+          <a:chOff x="0" y="0"/>
+          <a:chExt cx="0" cy="0"/>
+        </a:xfrm>
+      </p:grpSpPr>
+      <p:pic>
+        <p:nvPicPr>
+          <p:cNvPr id="1026" name="Picture 2">
+            <a:extLst>
+              <a:ext uri="{FF2B5EF4-FFF2-40B4-BE49-F238E27FC236}">
+                <a16:creationId xmlns:a16="http://schemas.microsoft.com/office/drawing/2014/main" id="{65B748D1-4C2C-4DB4-A601-E4DD2BC372CA}"/>
+              </a:ext>
+            </a:extLst>
+          </p:cNvPr>
+          <p:cNvPicPr>
+            <a:picLocks noChangeAspect="1" noChangeArrowheads="1"/>
+          </p:cNvPicPr>
+          <p:nvPr/>
+        </p:nvPicPr>
+        <p:blipFill>
+          <a:blip r:embed="rId3">
+            <a:extLst>
+              <a:ext uri="{28A0092B-C50C-407E-A947-70E740481C1C}">
+                <a14:useLocalDpi xmlns:a14="http://schemas.microsoft.com/office/drawing/2010/main" val="0"/>
+              </a:ext>
+            </a:extLst>
+          </a:blip>
+          <a:srcRect/>
+          <a:stretch>
+            <a:fillRect/>
+          </a:stretch>
+        </p:blipFill>
+        <p:spPr bwMode="auto">
+          <a:xfrm>
+            <a:off x="-10317" y="1935163"/>
+            <a:ext cx="4762500" cy="4762500"/>
+          </a:xfrm>
+          <a:prstGeom prst="rect">
+            <a:avLst/>
+          </a:prstGeom>
+          <a:noFill/>
+          <a:extLst>
+            <a:ext uri="{909E8E84-426E-40DD-AFC4-6F175D3DCCD1}">
+              <a14:hiddenFill xmlns:a14="http://schemas.microsoft.com/office/drawing/2010/main">
+                <a:solidFill>
+                  <a:srgbClr val="FFFFFF"/>
+                </a:solidFill>
+              </a14:hiddenFill>
+            </a:ext>
+          </a:extLst>
+        </p:spPr>
+      </p:pic>
+      <p:sp>
+        <p:nvSpPr>
+          <p:cNvPr id="2" name="Text Placeholder 1">
+            <a:extLst>
+              <a:ext uri="{FF2B5EF4-FFF2-40B4-BE49-F238E27FC236}">
+                <a16:creationId xmlns:a16="http://schemas.microsoft.com/office/drawing/2014/main" id="{EC7AB48A-CF5F-4D1D-9419-818085201FBA}"/>
+              </a:ext>
+            </a:extLst>
+          </p:cNvPr>
+          <p:cNvSpPr>
+            <a:spLocks noGrp="1"/>
+          </p:cNvSpPr>
+          <p:nvPr>
+            <p:ph type="body" sz="quarter" idx="10"/>
+          </p:nvPr>
+        </p:nvSpPr>
+        <p:spPr>
+          <a:xfrm>
+            <a:off x="269239" y="1189177"/>
+            <a:ext cx="11653523" cy="1307024"/>
+          </a:xfrm>
+        </p:spPr>
+        <p:txBody>
+          <a:bodyPr/>
+          <a:lstStyle/>
+          <a:p>
+            <a:pPr marL="336145" lvl="1" indent="0">
+              <a:buNone/>
+            </a:pPr>
+            <a:endParaRPr lang="en-US" dirty="0"/>
+          </a:p>
+          <a:p>
+            <a:pPr marL="336145" lvl="1" indent="0">
+              <a:buNone/>
+            </a:pPr>
+            <a:endParaRPr lang="en-US" dirty="0"/>
+          </a:p>
+          <a:p>
+            <a:pPr lvl="1"/>
+            <a:endParaRPr lang="en-US" dirty="0"/>
+          </a:p>
+        </p:txBody>
+      </p:sp>
+      <p:sp>
+        <p:nvSpPr>
+          <p:cNvPr id="3" name="Title 2">
+            <a:extLst>
+              <a:ext uri="{FF2B5EF4-FFF2-40B4-BE49-F238E27FC236}">
+                <a16:creationId xmlns:a16="http://schemas.microsoft.com/office/drawing/2014/main" id="{CA5EC639-3C23-4545-905C-F9F7DABF6E3C}"/>
+              </a:ext>
+            </a:extLst>
+          </p:cNvPr>
+          <p:cNvSpPr>
+            <a:spLocks noGrp="1"/>
+          </p:cNvSpPr>
+          <p:nvPr>
+            <p:ph type="title"/>
+          </p:nvPr>
+        </p:nvSpPr>
+        <p:spPr/>
+        <p:txBody>
+          <a:bodyPr/>
+          <a:lstStyle/>
+          <a:p>
+            <a:r>
+              <a:rPr lang="en-US" dirty="0"/>
+              <a:t>Plain-text response</a:t>
+            </a:r>
+          </a:p>
+        </p:txBody>
+      </p:sp>
+      <p:pic>
+        <p:nvPicPr>
+          <p:cNvPr id="6" name="Picture 5">
+            <a:extLst>
+              <a:ext uri="{FF2B5EF4-FFF2-40B4-BE49-F238E27FC236}">
+                <a16:creationId xmlns:a16="http://schemas.microsoft.com/office/drawing/2014/main" id="{A88C7983-CD80-4D73-995C-604630A4E5EF}"/>
+              </a:ext>
+            </a:extLst>
+          </p:cNvPr>
+          <p:cNvPicPr>
+            <a:picLocks noChangeAspect="1"/>
+          </p:cNvPicPr>
+          <p:nvPr/>
+        </p:nvPicPr>
+        <p:blipFill rotWithShape="1">
+          <a:blip r:embed="rId4" cstate="print">
+            <a:extLst>
+              <a:ext uri="{28A0092B-C50C-407E-A947-70E740481C1C}">
+                <a14:useLocalDpi xmlns:a14="http://schemas.microsoft.com/office/drawing/2010/main" val="0"/>
+              </a:ext>
+            </a:extLst>
+          </a:blip>
+          <a:srcRect/>
+          <a:stretch/>
+        </p:blipFill>
+        <p:spPr>
+          <a:xfrm>
+            <a:off x="1387060" y="-307481"/>
+            <a:ext cx="11053596" cy="7302006"/>
+          </a:xfrm>
+          <a:prstGeom prst="rect">
+            <a:avLst/>
+          </a:prstGeom>
+        </p:spPr>
+      </p:pic>
+      <p:graphicFrame>
+        <p:nvGraphicFramePr>
+          <p:cNvPr id="7" name="Table 6">
+            <a:extLst>
+              <a:ext uri="{FF2B5EF4-FFF2-40B4-BE49-F238E27FC236}">
+                <a16:creationId xmlns:a16="http://schemas.microsoft.com/office/drawing/2014/main" id="{01B12238-CBBE-45B0-AD28-0F48E2F96FC5}"/>
+              </a:ext>
+            </a:extLst>
+          </p:cNvPr>
+          <p:cNvGraphicFramePr>
+            <a:graphicFrameLocks noGrp="1"/>
+          </p:cNvGraphicFramePr>
+          <p:nvPr>
+            <p:extLst>
+              <p:ext uri="{D42A27DB-BD31-4B8C-83A1-F6EECF244321}">
+                <p14:modId xmlns:p14="http://schemas.microsoft.com/office/powerpoint/2010/main" val="1091455845"/>
+              </p:ext>
+            </p:extLst>
+          </p:nvPr>
+        </p:nvGraphicFramePr>
+        <p:xfrm>
+          <a:off x="3354806" y="1830943"/>
+          <a:ext cx="8497560" cy="4355154"/>
+        </p:xfrm>
+        <a:graphic>
+          <a:graphicData uri="http://schemas.openxmlformats.org/drawingml/2006/table">
+            <a:tbl>
+              <a:tblPr firstRow="1" bandRow="1">
+                <a:effectLst/>
+              </a:tblPr>
+              <a:tblGrid>
+                <a:gridCol w="8497560">
+                  <a:extLst>
+                    <a:ext uri="{9D8B030D-6E8A-4147-A177-3AD203B41FA5}">
+                      <a16:colId xmlns:a16="http://schemas.microsoft.com/office/drawing/2014/main" val="1057070397"/>
+                    </a:ext>
+                  </a:extLst>
+                </a:gridCol>
+              </a:tblGrid>
+              <a:tr h="3942888">
+                <a:tc>
+                  <a:txBody>
+                    <a:bodyPr/>
+                    <a:lstStyle>
+                      <a:lvl1pPr marL="0" algn="l" defTabSz="914400" rtl="0" eaLnBrk="1" latinLnBrk="0" hangingPunct="1">
+                        <a:defRPr sz="1800" b="1" kern="1200">
+                          <a:solidFill>
+                            <a:schemeClr val="lt1"/>
+                          </a:solidFill>
+                          <a:latin typeface="Segoe UI Light"/>
+                        </a:defRPr>
+                      </a:lvl1pPr>
+                      <a:lvl2pPr marL="457200" algn="l" defTabSz="914400" rtl="0" eaLnBrk="1" latinLnBrk="0" hangingPunct="1">
+                        <a:defRPr sz="1800" b="1" kern="1200">
+                          <a:solidFill>
+                            <a:schemeClr val="lt1"/>
+                          </a:solidFill>
+                          <a:latin typeface="Segoe UI Light"/>
+                        </a:defRPr>
+                      </a:lvl2pPr>
+                      <a:lvl3pPr marL="914400" algn="l" defTabSz="914400" rtl="0" eaLnBrk="1" latinLnBrk="0" hangingPunct="1">
+                        <a:defRPr sz="1800" b="1" kern="1200">
+                          <a:solidFill>
+                            <a:schemeClr val="lt1"/>
+                          </a:solidFill>
+                          <a:latin typeface="Segoe UI Light"/>
+                        </a:defRPr>
+                      </a:lvl3pPr>
+                      <a:lvl4pPr marL="1371600" algn="l" defTabSz="914400" rtl="0" eaLnBrk="1" latinLnBrk="0" hangingPunct="1">
+                        <a:defRPr sz="1800" b="1" kern="1200">
+                          <a:solidFill>
+                            <a:schemeClr val="lt1"/>
+                          </a:solidFill>
+                          <a:latin typeface="Segoe UI Light"/>
+                        </a:defRPr>
+                      </a:lvl4pPr>
+                      <a:lvl5pPr marL="1828800" algn="l" defTabSz="914400" rtl="0" eaLnBrk="1" latinLnBrk="0" hangingPunct="1">
+                        <a:defRPr sz="1800" b="1" kern="1200">
+                          <a:solidFill>
+                            <a:schemeClr val="lt1"/>
+                          </a:solidFill>
+                          <a:latin typeface="Segoe UI Light"/>
+                        </a:defRPr>
+                      </a:lvl5pPr>
+                      <a:lvl6pPr marL="2286000" algn="l" defTabSz="914400" rtl="0" eaLnBrk="1" latinLnBrk="0" hangingPunct="1">
+                        <a:defRPr sz="1800" b="1" kern="1200">
+                          <a:solidFill>
+                            <a:schemeClr val="lt1"/>
+                          </a:solidFill>
+                          <a:latin typeface="Segoe UI Light"/>
+                        </a:defRPr>
+                      </a:lvl6pPr>
+                      <a:lvl7pPr marL="2743200" algn="l" defTabSz="914400" rtl="0" eaLnBrk="1" latinLnBrk="0" hangingPunct="1">
+                        <a:defRPr sz="1800" b="1" kern="1200">
+                          <a:solidFill>
+                            <a:schemeClr val="lt1"/>
+                          </a:solidFill>
+                          <a:latin typeface="Segoe UI Light"/>
+                        </a:defRPr>
+                      </a:lvl7pPr>
+                      <a:lvl8pPr marL="3200400" algn="l" defTabSz="914400" rtl="0" eaLnBrk="1" latinLnBrk="0" hangingPunct="1">
+                        <a:defRPr sz="1800" b="1" kern="1200">
+                          <a:solidFill>
+                            <a:schemeClr val="lt1"/>
+                          </a:solidFill>
+                          <a:latin typeface="Segoe UI Light"/>
+                        </a:defRPr>
+                      </a:lvl8pPr>
+                      <a:lvl9pPr marL="3657600" algn="l" defTabSz="914400" rtl="0" eaLnBrk="1" latinLnBrk="0" hangingPunct="1">
+                        <a:defRPr sz="1800" b="1" kern="1200">
+                          <a:solidFill>
+                            <a:schemeClr val="lt1"/>
+                          </a:solidFill>
+                          <a:latin typeface="Segoe UI Light"/>
+                        </a:defRPr>
+                      </a:lvl9pPr>
+                    </a:lstStyle>
+                    <a:p>
+                      <a:r>
+                        <a:rPr lang="en-US" sz="1600" dirty="0">
+                          <a:solidFill>
+                            <a:srgbClr val="0000FF"/>
+                          </a:solidFill>
+                          <a:latin typeface="Consolas" panose="020B0609020204030204" pitchFamily="49" charset="0"/>
+                        </a:rPr>
+                        <a:t>https://localhost:5001/weatherforecast&gt; GET Chicago</a:t>
+                      </a:r>
+                    </a:p>
+                    <a:p>
+                      <a:r>
+                        <a:rPr lang="en-US" sz="1600" dirty="0">
+                          <a:solidFill>
+                            <a:srgbClr val="0000FF"/>
+                          </a:solidFill>
+                          <a:latin typeface="Consolas" panose="020B0609020204030204" pitchFamily="49" charset="0"/>
+                        </a:rPr>
+                        <a:t>HTTP/1.1 500 Internal Server Error</a:t>
+                      </a:r>
+                    </a:p>
+                    <a:p>
+                      <a:r>
+                        <a:rPr lang="en-US" sz="1600" dirty="0">
+                          <a:solidFill>
+                            <a:srgbClr val="0000FF"/>
+                          </a:solidFill>
+                          <a:latin typeface="Consolas" panose="020B0609020204030204" pitchFamily="49" charset="0"/>
+                        </a:rPr>
+                        <a:t>Content-Type: text/plain</a:t>
+                      </a:r>
+                    </a:p>
+                    <a:p>
+                      <a:r>
+                        <a:rPr lang="en-US" sz="1600" dirty="0">
+                          <a:solidFill>
+                            <a:srgbClr val="0000FF"/>
+                          </a:solidFill>
+                          <a:latin typeface="Consolas" panose="020B0609020204030204" pitchFamily="49" charset="0"/>
+                        </a:rPr>
+                        <a:t>Date: Wed, 02 Oct 2019 01:50:48 GMT</a:t>
+                      </a:r>
+                    </a:p>
+                    <a:p>
+                      <a:r>
+                        <a:rPr lang="en-US" sz="1600" dirty="0">
+                          <a:solidFill>
+                            <a:srgbClr val="0000FF"/>
+                          </a:solidFill>
+                          <a:latin typeface="Consolas" panose="020B0609020204030204" pitchFamily="49" charset="0"/>
+                        </a:rPr>
+                        <a:t>Server: Kestrel</a:t>
+                      </a:r>
+                    </a:p>
+                    <a:p>
+                      <a:r>
+                        <a:rPr lang="en-US" sz="1600" dirty="0">
+                          <a:solidFill>
+                            <a:srgbClr val="0000FF"/>
+                          </a:solidFill>
+                          <a:latin typeface="Consolas" panose="020B0609020204030204" pitchFamily="49" charset="0"/>
+                        </a:rPr>
+                        <a:t>Transfer-Encoding: chunked</a:t>
+                      </a:r>
+                    </a:p>
+                    <a:p>
+                      <a:endParaRPr lang="en-US" sz="1600" dirty="0">
+                        <a:solidFill>
+                          <a:srgbClr val="0000FF"/>
+                        </a:solidFill>
+                        <a:latin typeface="Consolas" panose="020B0609020204030204" pitchFamily="49" charset="0"/>
+                      </a:endParaRPr>
+                    </a:p>
+                    <a:p>
+                      <a:r>
+                        <a:rPr lang="en-US" sz="1600" dirty="0" err="1">
+                          <a:solidFill>
+                            <a:srgbClr val="0000FF"/>
+                          </a:solidFill>
+                          <a:latin typeface="Consolas" panose="020B0609020204030204" pitchFamily="49" charset="0"/>
+                        </a:rPr>
+                        <a:t>System.ArgumentException</a:t>
+                      </a:r>
+                      <a:r>
+                        <a:rPr lang="en-US" sz="1600" dirty="0">
+                          <a:solidFill>
+                            <a:srgbClr val="0000FF"/>
+                          </a:solidFill>
+                          <a:latin typeface="Consolas" panose="020B0609020204030204" pitchFamily="49" charset="0"/>
+                        </a:rPr>
+                        <a:t>: Weather forecast unavailable for Chicago. (Parameter 'city')</a:t>
+                      </a:r>
+                    </a:p>
+                    <a:p>
+                      <a:r>
+                        <a:rPr lang="en-US" sz="1600" dirty="0">
+                          <a:solidFill>
+                            <a:srgbClr val="0000FF"/>
+                          </a:solidFill>
+                          <a:latin typeface="Consolas" panose="020B0609020204030204" pitchFamily="49" charset="0"/>
+                        </a:rPr>
+                        <a:t>   at WebApplication3.Controllers.WeatherForecastController.Get(String city) in C:\Users\scaddie\source\repos\WebApplication3\Controllers\WeatherForecastController.cs:line 35</a:t>
+                      </a:r>
+                    </a:p>
+                    <a:p>
+                      <a:r>
+                        <a:rPr lang="en-US" sz="1600" dirty="0">
+                          <a:solidFill>
+                            <a:srgbClr val="0000FF"/>
+                          </a:solidFill>
+                          <a:latin typeface="Consolas" panose="020B0609020204030204" pitchFamily="49" charset="0"/>
+                        </a:rPr>
+                        <a:t>   at </a:t>
+                      </a:r>
+                      <a:r>
+                        <a:rPr lang="en-US" sz="1600" dirty="0" err="1">
+                          <a:solidFill>
+                            <a:srgbClr val="0000FF"/>
+                          </a:solidFill>
+                          <a:latin typeface="Consolas" panose="020B0609020204030204" pitchFamily="49" charset="0"/>
+                        </a:rPr>
+                        <a:t>lambda_method</a:t>
+                      </a:r>
+                      <a:r>
+                        <a:rPr lang="en-US" sz="1600" dirty="0">
+                          <a:solidFill>
+                            <a:srgbClr val="0000FF"/>
+                          </a:solidFill>
+                          <a:latin typeface="Consolas" panose="020B0609020204030204" pitchFamily="49" charset="0"/>
+                        </a:rPr>
+                        <a:t>(Closure , Object , Object[] )</a:t>
+                      </a:r>
+                    </a:p>
+                    <a:p>
+                      <a:r>
+                        <a:rPr lang="en-US" sz="1600" dirty="0">
+                          <a:solidFill>
+                            <a:srgbClr val="0000FF"/>
+                          </a:solidFill>
+                          <a:latin typeface="Consolas" panose="020B0609020204030204" pitchFamily="49" charset="0"/>
+                        </a:rPr>
+                        <a:t>   at </a:t>
+                      </a:r>
+                      <a:r>
+                        <a:rPr lang="en-US" sz="1600" dirty="0" err="1">
+                          <a:solidFill>
+                            <a:srgbClr val="0000FF"/>
+                          </a:solidFill>
+                          <a:latin typeface="Consolas" panose="020B0609020204030204" pitchFamily="49" charset="0"/>
+                        </a:rPr>
+                        <a:t>Microsoft.Extensions.Internal.ObjectMethodExecutor.Execute</a:t>
+                      </a:r>
+                      <a:r>
+                        <a:rPr lang="en-US" sz="1600" dirty="0">
+                          <a:solidFill>
+                            <a:srgbClr val="0000FF"/>
+                          </a:solidFill>
+                          <a:latin typeface="Consolas" panose="020B0609020204030204" pitchFamily="49" charset="0"/>
+                        </a:rPr>
+                        <a:t>(Object target, Object[] parameters)</a:t>
+                      </a:r>
+                    </a:p>
+                  </a:txBody>
+                  <a:tcPr>
+                    <a:lnL w="12700" cap="flat" cmpd="sng" algn="ctr">
+                      <a:solidFill>
+                        <a:sysClr val="window" lastClr="FFFFFF"/>
+                      </a:solidFill>
+                      <a:prstDash val="solid"/>
+                      <a:round/>
+                      <a:headEnd type="none" w="med" len="med"/>
+                      <a:tailEnd type="none" w="med" len="med"/>
+                    </a:lnL>
+                    <a:lnR w="12700" cap="flat" cmpd="sng" algn="ctr">
+                      <a:solidFill>
+                        <a:sysClr val="window" lastClr="FFFFFF"/>
+                      </a:solidFill>
+                      <a:prstDash val="solid"/>
+                      <a:round/>
+                      <a:headEnd type="none" w="med" len="med"/>
+                      <a:tailEnd type="none" w="med" len="med"/>
+                    </a:lnR>
+                    <a:lnT w="12700" cap="flat" cmpd="sng" algn="ctr">
+                      <a:solidFill>
+                        <a:schemeClr val="tx1"/>
+                      </a:solidFill>
+                      <a:prstDash val="solid"/>
+                      <a:round/>
+                      <a:headEnd type="none" w="med" len="med"/>
+                      <a:tailEnd type="none" w="med" len="med"/>
+                    </a:lnT>
+                    <a:lnB w="12700" cap="flat" cmpd="sng" algn="ctr">
+                      <a:solidFill>
+                        <a:sysClr val="window" lastClr="FFFFFF"/>
+                      </a:solidFill>
+                      <a:prstDash val="solid"/>
+                      <a:round/>
+                      <a:headEnd type="none" w="med" len="med"/>
+                      <a:tailEnd type="none" w="med" len="med"/>
+                    </a:lnB>
+                    <a:lnTlToBr w="12700" cmpd="sng">
+                      <a:noFill/>
+                      <a:prstDash val="solid"/>
+                    </a:lnTlToBr>
+                    <a:lnBlToTr w="12700" cmpd="sng">
+                      <a:noFill/>
+                      <a:prstDash val="solid"/>
+                    </a:lnBlToTr>
+                    <a:solidFill>
+                      <a:sysClr val="window" lastClr="FFFFFF"/>
+                    </a:solidFill>
+                  </a:tcPr>
+                </a:tc>
+                <a:extLst>
+                  <a:ext uri="{0D108BD9-81ED-4DB2-BD59-A6C34878D82A}">
+                    <a16:rowId xmlns:a16="http://schemas.microsoft.com/office/drawing/2014/main" val="3473222697"/>
+                  </a:ext>
+                </a:extLst>
+              </a:tr>
+              <a:tr h="362274">
+                <a:tc>
+                  <a:txBody>
+                    <a:bodyPr/>
+                    <a:lstStyle/>
+                    <a:p>
+                      <a:endParaRPr lang="en-US" sz="1600" dirty="0">
+                        <a:solidFill>
+                          <a:srgbClr val="000000"/>
+                        </a:solidFill>
+                        <a:latin typeface="Consolas" panose="020B0609020204030204" pitchFamily="49" charset="0"/>
+                      </a:endParaRPr>
+                    </a:p>
+                  </a:txBody>
+                  <a:tcPr>
+                    <a:lnL w="12700" cap="flat" cmpd="sng" algn="ctr">
+                      <a:solidFill>
+                        <a:sysClr val="window" lastClr="FFFFFF"/>
+                      </a:solidFill>
+                      <a:prstDash val="solid"/>
+                      <a:round/>
+                      <a:headEnd type="none" w="med" len="med"/>
+                      <a:tailEnd type="none" w="med" len="med"/>
+                    </a:lnL>
+                    <a:lnR w="12700" cap="flat" cmpd="sng" algn="ctr">
+                      <a:solidFill>
+                        <a:sysClr val="window" lastClr="FFFFFF"/>
+                      </a:solidFill>
+                      <a:prstDash val="solid"/>
+                      <a:round/>
+                      <a:headEnd type="none" w="med" len="med"/>
+                      <a:tailEnd type="none" w="med" len="med"/>
+                    </a:lnR>
+                    <a:lnT w="12700" cap="flat" cmpd="sng" algn="ctr">
+                      <a:solidFill>
+                        <a:sysClr val="window" lastClr="FFFFFF"/>
+                      </a:solidFill>
+                      <a:prstDash val="solid"/>
+                      <a:round/>
+                      <a:headEnd type="none" w="med" len="med"/>
+                      <a:tailEnd type="none" w="med" len="med"/>
+                    </a:lnT>
+                    <a:lnB w="12700" cap="flat" cmpd="sng" algn="ctr">
+                      <a:solidFill>
+                        <a:sysClr val="window" lastClr="FFFFFF"/>
+                      </a:solidFill>
+                      <a:prstDash val="solid"/>
+                      <a:round/>
+                      <a:headEnd type="none" w="med" len="med"/>
+                      <a:tailEnd type="none" w="med" len="med"/>
+                    </a:lnB>
+                    <a:lnTlToBr w="12700" cmpd="sng">
+                      <a:noFill/>
+                      <a:prstDash val="solid"/>
+                    </a:lnTlToBr>
+                    <a:lnBlToTr w="12700" cmpd="sng">
+                      <a:noFill/>
+                      <a:prstDash val="solid"/>
+                    </a:lnBlToTr>
+                    <a:solidFill>
+                      <a:sysClr val="window" lastClr="FFFFFF"/>
+                    </a:solidFill>
+                  </a:tcPr>
+                </a:tc>
+                <a:extLst>
+                  <a:ext uri="{0D108BD9-81ED-4DB2-BD59-A6C34878D82A}">
+                    <a16:rowId xmlns:a16="http://schemas.microsoft.com/office/drawing/2014/main" val="97062865"/>
+                  </a:ext>
+                </a:extLst>
+              </a:tr>
+            </a:tbl>
+          </a:graphicData>
+        </a:graphic>
+      </p:graphicFrame>
+      <p:sp>
+        <p:nvSpPr>
+          <p:cNvPr id="8" name="Rectangle 7">
+            <a:extLst>
+              <a:ext uri="{FF2B5EF4-FFF2-40B4-BE49-F238E27FC236}">
+                <a16:creationId xmlns:a16="http://schemas.microsoft.com/office/drawing/2014/main" id="{4C97B6E7-EB3E-4FB8-9315-7B6EC6471E23}"/>
+              </a:ext>
+            </a:extLst>
+          </p:cNvPr>
+          <p:cNvSpPr/>
+          <p:nvPr/>
+        </p:nvSpPr>
+        <p:spPr>
+          <a:xfrm>
+            <a:off x="3354806" y="1370995"/>
+            <a:ext cx="1978891" cy="446567"/>
+          </a:xfrm>
+          <a:prstGeom prst="rect">
+            <a:avLst/>
+          </a:prstGeom>
+          <a:solidFill>
+            <a:schemeClr val="accent1"/>
+          </a:solidFill>
+          <a:ln w="6350" cap="flat" cmpd="sng" algn="ctr">
+            <a:solidFill>
+              <a:schemeClr val="bg1"/>
+            </a:solidFill>
+            <a:prstDash val="solid"/>
+            <a:miter lim="800000"/>
+          </a:ln>
+          <a:effectLst/>
+        </p:spPr>
+        <p:txBody>
+          <a:bodyPr rtlCol="0" anchor="ctr"/>
+          <a:lstStyle/>
+          <a:p>
+            <a:pPr marL="0" marR="0" lvl="0" indent="0" defTabSz="914400" eaLnBrk="1" fontAlgn="auto" latinLnBrk="0" hangingPunct="1">
+              <a:lnSpc>
+                <a:spcPct val="100000"/>
+              </a:lnSpc>
+              <a:spcBef>
+                <a:spcPts val="0"/>
+              </a:spcBef>
+              <a:spcAft>
+                <a:spcPts val="0"/>
+              </a:spcAft>
+              <a:buClrTx/>
+              <a:buSzTx/>
+              <a:buFontTx/>
+              <a:buNone/>
+              <a:tabLst/>
+              <a:defRPr/>
+            </a:pPr>
+            <a:r>
+              <a:rPr lang="en-US" b="1" kern="0" dirty="0" err="1">
+                <a:solidFill>
+                  <a:schemeClr val="bg1"/>
+                </a:solidFill>
+                <a:latin typeface="Segoe UI Light"/>
+              </a:rPr>
+              <a:t>cmd</a:t>
+            </a:r>
+            <a:r>
+              <a:rPr lang="en-US" b="1" kern="0" dirty="0">
+                <a:solidFill>
+                  <a:schemeClr val="bg1"/>
+                </a:solidFill>
+                <a:latin typeface="Segoe UI Light"/>
+              </a:rPr>
+              <a:t> - </a:t>
+            </a:r>
+            <a:r>
+              <a:rPr lang="en-US" b="1" kern="0" dirty="0" err="1">
+                <a:solidFill>
+                  <a:schemeClr val="bg1"/>
+                </a:solidFill>
+                <a:latin typeface="Segoe UI Light"/>
+              </a:rPr>
+              <a:t>httprepl</a:t>
+            </a:r>
+            <a:r>
+              <a:rPr lang="en-US" b="1" kern="0" dirty="0">
+                <a:solidFill>
+                  <a:schemeClr val="bg1"/>
+                </a:solidFill>
+                <a:latin typeface="Segoe UI Light"/>
+              </a:rPr>
+              <a:t>    </a:t>
+            </a:r>
+            <a:endParaRPr kumimoji="0" lang="en-US" sz="1800" i="0" u="none" strike="noStrike" kern="0" cap="none" spc="0" normalizeH="0" baseline="0" noProof="0" dirty="0">
+              <a:ln>
+                <a:noFill/>
+              </a:ln>
+              <a:solidFill>
+                <a:schemeClr val="bg1"/>
+              </a:solidFill>
+              <a:effectLst/>
+              <a:uLnTx/>
+              <a:uFillTx/>
+              <a:latin typeface="Arial" panose="020B0604020202020204" pitchFamily="34" charset="0"/>
+              <a:cs typeface="Arial" panose="020B0604020202020204" pitchFamily="34" charset="0"/>
+            </a:endParaRPr>
+          </a:p>
+        </p:txBody>
+      </p:sp>
+    </p:spTree>
+    <p:extLst>
+      <p:ext uri="{BB962C8B-B14F-4D97-AF65-F5344CB8AC3E}">
+        <p14:creationId xmlns:p14="http://schemas.microsoft.com/office/powerpoint/2010/main" val="4075246709"/>
+      </p:ext>
+    </p:extLst>
+  </p:cSld>
+  <p:clrMapOvr>
+    <a:masterClrMapping/>
+  </p:clrMapOvr>
+  <p:transition>
+    <p:fade/>
+  </p:transition>
+</p:sld>
+</file>
+
+<file path=ppt/slides/slide14.xml><?xml version="1.0" encoding="utf-8"?>
+<p:sld xmlns:a="http://schemas.openxmlformats.org/drawingml/2006/main" xmlns:r="http://schemas.openxmlformats.org/officeDocument/2006/relationships" xmlns:p="http://schemas.openxmlformats.org/presentationml/2006/main">
+  <p:cSld>
+    <p:spTree>
+      <p:nvGrpSpPr>
+        <p:cNvPr id="1" name=""/>
+        <p:cNvGrpSpPr/>
+        <p:nvPr/>
+      </p:nvGrpSpPr>
+      <p:grpSpPr>
+        <a:xfrm>
+          <a:off x="0" y="0"/>
+          <a:ext cx="0" cy="0"/>
+          <a:chOff x="0" y="0"/>
+          <a:chExt cx="0" cy="0"/>
+        </a:xfrm>
+      </p:grpSpPr>
+      <p:pic>
+        <p:nvPicPr>
+          <p:cNvPr id="1026" name="Picture 2">
+            <a:extLst>
+              <a:ext uri="{FF2B5EF4-FFF2-40B4-BE49-F238E27FC236}">
+                <a16:creationId xmlns:a16="http://schemas.microsoft.com/office/drawing/2014/main" id="{65B748D1-4C2C-4DB4-A601-E4DD2BC372CA}"/>
+              </a:ext>
+            </a:extLst>
+          </p:cNvPr>
+          <p:cNvPicPr>
+            <a:picLocks noChangeAspect="1" noChangeArrowheads="1"/>
+          </p:cNvPicPr>
+          <p:nvPr/>
+        </p:nvPicPr>
+        <p:blipFill>
+          <a:blip r:embed="rId3">
+            <a:extLst>
+              <a:ext uri="{28A0092B-C50C-407E-A947-70E740481C1C}">
+                <a14:useLocalDpi xmlns:a14="http://schemas.microsoft.com/office/drawing/2010/main" val="0"/>
+              </a:ext>
+            </a:extLst>
+          </a:blip>
+          <a:srcRect/>
+          <a:stretch>
+            <a:fillRect/>
+          </a:stretch>
+        </p:blipFill>
+        <p:spPr bwMode="auto">
+          <a:xfrm>
+            <a:off x="-10317" y="1935163"/>
+            <a:ext cx="4762500" cy="4762500"/>
+          </a:xfrm>
+          <a:prstGeom prst="rect">
+            <a:avLst/>
+          </a:prstGeom>
+          <a:noFill/>
+          <a:extLst>
+            <a:ext uri="{909E8E84-426E-40DD-AFC4-6F175D3DCCD1}">
+              <a14:hiddenFill xmlns:a14="http://schemas.microsoft.com/office/drawing/2010/main">
+                <a:solidFill>
+                  <a:srgbClr val="FFFFFF"/>
+                </a:solidFill>
+              </a14:hiddenFill>
+            </a:ext>
+          </a:extLst>
+        </p:spPr>
+      </p:pic>
+      <p:sp>
+        <p:nvSpPr>
+          <p:cNvPr id="2" name="Text Placeholder 1">
+            <a:extLst>
+              <a:ext uri="{FF2B5EF4-FFF2-40B4-BE49-F238E27FC236}">
+                <a16:creationId xmlns:a16="http://schemas.microsoft.com/office/drawing/2014/main" id="{EC7AB48A-CF5F-4D1D-9419-818085201FBA}"/>
+              </a:ext>
+            </a:extLst>
+          </p:cNvPr>
+          <p:cNvSpPr>
+            <a:spLocks noGrp="1"/>
+          </p:cNvSpPr>
+          <p:nvPr>
+            <p:ph type="body" sz="quarter" idx="10"/>
+          </p:nvPr>
+        </p:nvSpPr>
+        <p:spPr>
+          <a:xfrm>
+            <a:off x="269239" y="1189177"/>
+            <a:ext cx="11653523" cy="1307024"/>
+          </a:xfrm>
+        </p:spPr>
+        <p:txBody>
+          <a:bodyPr/>
+          <a:lstStyle/>
+          <a:p>
+            <a:pPr marL="336145" lvl="1" indent="0">
+              <a:buNone/>
+            </a:pPr>
+            <a:endParaRPr lang="en-US" dirty="0"/>
+          </a:p>
+          <a:p>
+            <a:pPr marL="336145" lvl="1" indent="0">
+              <a:buNone/>
+            </a:pPr>
+            <a:endParaRPr lang="en-US" dirty="0"/>
+          </a:p>
+          <a:p>
+            <a:pPr lvl="1"/>
+            <a:endParaRPr lang="en-US" dirty="0"/>
+          </a:p>
+        </p:txBody>
+      </p:sp>
+      <p:sp>
+        <p:nvSpPr>
+          <p:cNvPr id="3" name="Title 2">
+            <a:extLst>
+              <a:ext uri="{FF2B5EF4-FFF2-40B4-BE49-F238E27FC236}">
+                <a16:creationId xmlns:a16="http://schemas.microsoft.com/office/drawing/2014/main" id="{CA5EC639-3C23-4545-905C-F9F7DABF6E3C}"/>
+              </a:ext>
+            </a:extLst>
+          </p:cNvPr>
+          <p:cNvSpPr>
+            <a:spLocks noGrp="1"/>
+          </p:cNvSpPr>
+          <p:nvPr>
+            <p:ph type="title"/>
+          </p:nvPr>
+        </p:nvSpPr>
+        <p:spPr/>
+        <p:txBody>
+          <a:bodyPr/>
+          <a:lstStyle/>
+          <a:p>
+            <a:r>
+              <a:rPr lang="en-US" dirty="0"/>
+              <a:t>HTML response</a:t>
+            </a:r>
+          </a:p>
+        </p:txBody>
+      </p:sp>
+      <p:pic>
+        <p:nvPicPr>
+          <p:cNvPr id="6" name="Picture 5">
+            <a:extLst>
+              <a:ext uri="{FF2B5EF4-FFF2-40B4-BE49-F238E27FC236}">
+                <a16:creationId xmlns:a16="http://schemas.microsoft.com/office/drawing/2014/main" id="{A88C7983-CD80-4D73-995C-604630A4E5EF}"/>
+              </a:ext>
+            </a:extLst>
+          </p:cNvPr>
+          <p:cNvPicPr>
+            <a:picLocks noChangeAspect="1"/>
+          </p:cNvPicPr>
+          <p:nvPr/>
+        </p:nvPicPr>
+        <p:blipFill rotWithShape="1">
+          <a:blip r:embed="rId4" cstate="print">
+            <a:extLst>
+              <a:ext uri="{28A0092B-C50C-407E-A947-70E740481C1C}">
+                <a14:useLocalDpi xmlns:a14="http://schemas.microsoft.com/office/drawing/2010/main" val="0"/>
+              </a:ext>
+            </a:extLst>
+          </a:blip>
+          <a:srcRect/>
+          <a:stretch/>
+        </p:blipFill>
+        <p:spPr>
+          <a:xfrm>
+            <a:off x="1387060" y="-307481"/>
+            <a:ext cx="11053596" cy="7302006"/>
+          </a:xfrm>
+          <a:prstGeom prst="rect">
+            <a:avLst/>
+          </a:prstGeom>
+        </p:spPr>
+      </p:pic>
+      <p:graphicFrame>
+        <p:nvGraphicFramePr>
+          <p:cNvPr id="7" name="Table 6">
+            <a:extLst>
+              <a:ext uri="{FF2B5EF4-FFF2-40B4-BE49-F238E27FC236}">
+                <a16:creationId xmlns:a16="http://schemas.microsoft.com/office/drawing/2014/main" id="{01B12238-CBBE-45B0-AD28-0F48E2F96FC5}"/>
+              </a:ext>
+            </a:extLst>
+          </p:cNvPr>
+          <p:cNvGraphicFramePr>
+            <a:graphicFrameLocks noGrp="1"/>
+          </p:cNvGraphicFramePr>
+          <p:nvPr>
+            <p:extLst>
+              <p:ext uri="{D42A27DB-BD31-4B8C-83A1-F6EECF244321}">
+                <p14:modId xmlns:p14="http://schemas.microsoft.com/office/powerpoint/2010/main" val="2981167908"/>
+              </p:ext>
+            </p:extLst>
+          </p:nvPr>
+        </p:nvGraphicFramePr>
+        <p:xfrm>
+          <a:off x="3354806" y="1830943"/>
+          <a:ext cx="8497560" cy="4355154"/>
+        </p:xfrm>
+        <a:graphic>
+          <a:graphicData uri="http://schemas.openxmlformats.org/drawingml/2006/table">
+            <a:tbl>
+              <a:tblPr firstRow="1" bandRow="1">
+                <a:effectLst/>
+              </a:tblPr>
+              <a:tblGrid>
+                <a:gridCol w="8497560">
+                  <a:extLst>
+                    <a:ext uri="{9D8B030D-6E8A-4147-A177-3AD203B41FA5}">
+                      <a16:colId xmlns:a16="http://schemas.microsoft.com/office/drawing/2014/main" val="1057070397"/>
+                    </a:ext>
+                  </a:extLst>
+                </a:gridCol>
+              </a:tblGrid>
+              <a:tr h="3942888">
+                <a:tc>
+                  <a:txBody>
+                    <a:bodyPr/>
+                    <a:lstStyle>
+                      <a:lvl1pPr marL="0" algn="l" defTabSz="914400" rtl="0" eaLnBrk="1" latinLnBrk="0" hangingPunct="1">
+                        <a:defRPr sz="1800" b="1" kern="1200">
+                          <a:solidFill>
+                            <a:schemeClr val="lt1"/>
+                          </a:solidFill>
+                          <a:latin typeface="Segoe UI Light"/>
+                        </a:defRPr>
+                      </a:lvl1pPr>
+                      <a:lvl2pPr marL="457200" algn="l" defTabSz="914400" rtl="0" eaLnBrk="1" latinLnBrk="0" hangingPunct="1">
+                        <a:defRPr sz="1800" b="1" kern="1200">
+                          <a:solidFill>
+                            <a:schemeClr val="lt1"/>
+                          </a:solidFill>
+                          <a:latin typeface="Segoe UI Light"/>
+                        </a:defRPr>
+                      </a:lvl2pPr>
+                      <a:lvl3pPr marL="914400" algn="l" defTabSz="914400" rtl="0" eaLnBrk="1" latinLnBrk="0" hangingPunct="1">
+                        <a:defRPr sz="1800" b="1" kern="1200">
+                          <a:solidFill>
+                            <a:schemeClr val="lt1"/>
+                          </a:solidFill>
+                          <a:latin typeface="Segoe UI Light"/>
+                        </a:defRPr>
+                      </a:lvl3pPr>
+                      <a:lvl4pPr marL="1371600" algn="l" defTabSz="914400" rtl="0" eaLnBrk="1" latinLnBrk="0" hangingPunct="1">
+                        <a:defRPr sz="1800" b="1" kern="1200">
+                          <a:solidFill>
+                            <a:schemeClr val="lt1"/>
+                          </a:solidFill>
+                          <a:latin typeface="Segoe UI Light"/>
+                        </a:defRPr>
+                      </a:lvl4pPr>
+                      <a:lvl5pPr marL="1828800" algn="l" defTabSz="914400" rtl="0" eaLnBrk="1" latinLnBrk="0" hangingPunct="1">
+                        <a:defRPr sz="1800" b="1" kern="1200">
+                          <a:solidFill>
+                            <a:schemeClr val="lt1"/>
+                          </a:solidFill>
+                          <a:latin typeface="Segoe UI Light"/>
+                        </a:defRPr>
+                      </a:lvl5pPr>
+                      <a:lvl6pPr marL="2286000" algn="l" defTabSz="914400" rtl="0" eaLnBrk="1" latinLnBrk="0" hangingPunct="1">
+                        <a:defRPr sz="1800" b="1" kern="1200">
+                          <a:solidFill>
+                            <a:schemeClr val="lt1"/>
+                          </a:solidFill>
+                          <a:latin typeface="Segoe UI Light"/>
+                        </a:defRPr>
+                      </a:lvl6pPr>
+                      <a:lvl7pPr marL="2743200" algn="l" defTabSz="914400" rtl="0" eaLnBrk="1" latinLnBrk="0" hangingPunct="1">
+                        <a:defRPr sz="1800" b="1" kern="1200">
+                          <a:solidFill>
+                            <a:schemeClr val="lt1"/>
+                          </a:solidFill>
+                          <a:latin typeface="Segoe UI Light"/>
+                        </a:defRPr>
+                      </a:lvl7pPr>
+                      <a:lvl8pPr marL="3200400" algn="l" defTabSz="914400" rtl="0" eaLnBrk="1" latinLnBrk="0" hangingPunct="1">
+                        <a:defRPr sz="1800" b="1" kern="1200">
+                          <a:solidFill>
+                            <a:schemeClr val="lt1"/>
+                          </a:solidFill>
+                          <a:latin typeface="Segoe UI Light"/>
+                        </a:defRPr>
+                      </a:lvl8pPr>
+                      <a:lvl9pPr marL="3657600" algn="l" defTabSz="914400" rtl="0" eaLnBrk="1" latinLnBrk="0" hangingPunct="1">
+                        <a:defRPr sz="1800" b="1" kern="1200">
+                          <a:solidFill>
+                            <a:schemeClr val="lt1"/>
+                          </a:solidFill>
+                          <a:latin typeface="Segoe UI Light"/>
+                        </a:defRPr>
+                      </a:lvl9pPr>
+                    </a:lstStyle>
+                    <a:p>
+                      <a:r>
+                        <a:rPr lang="en-US" sz="1600" dirty="0">
+                          <a:solidFill>
+                            <a:srgbClr val="0000FF"/>
+                          </a:solidFill>
+                          <a:latin typeface="Consolas" panose="020B0609020204030204" pitchFamily="49" charset="0"/>
+                        </a:rPr>
+                        <a:t>https://localhost:5001/weatherforecast&gt; GET Chicago -h Accept=text/html</a:t>
+                      </a:r>
+                    </a:p>
+                    <a:p>
+                      <a:r>
+                        <a:rPr lang="en-US" sz="1600" dirty="0">
+                          <a:solidFill>
+                            <a:srgbClr val="0000FF"/>
+                          </a:solidFill>
+                          <a:latin typeface="Consolas" panose="020B0609020204030204" pitchFamily="49" charset="0"/>
+                        </a:rPr>
+                        <a:t>HTTP/1.1 500 Internal Server Error</a:t>
+                      </a:r>
+                    </a:p>
+                    <a:p>
+                      <a:r>
+                        <a:rPr lang="en-US" sz="1600" dirty="0">
+                          <a:solidFill>
+                            <a:srgbClr val="0000FF"/>
+                          </a:solidFill>
+                          <a:latin typeface="Consolas" panose="020B0609020204030204" pitchFamily="49" charset="0"/>
+                        </a:rPr>
+                        <a:t>Content-Type: text/html; charset=utf-8</a:t>
+                      </a:r>
+                    </a:p>
+                    <a:p>
+                      <a:r>
+                        <a:rPr lang="en-US" sz="1600" dirty="0">
+                          <a:solidFill>
+                            <a:srgbClr val="0000FF"/>
+                          </a:solidFill>
+                          <a:latin typeface="Consolas" panose="020B0609020204030204" pitchFamily="49" charset="0"/>
+                        </a:rPr>
+                        <a:t>Date: Wed, 02 Oct 2019 02:07:06 GMT</a:t>
+                      </a:r>
+                    </a:p>
+                    <a:p>
+                      <a:r>
+                        <a:rPr lang="en-US" sz="1600" dirty="0">
+                          <a:solidFill>
+                            <a:srgbClr val="0000FF"/>
+                          </a:solidFill>
+                          <a:latin typeface="Consolas" panose="020B0609020204030204" pitchFamily="49" charset="0"/>
+                        </a:rPr>
+                        <a:t>Server: Kestrel</a:t>
+                      </a:r>
+                    </a:p>
+                    <a:p>
+                      <a:r>
+                        <a:rPr lang="en-US" sz="1600" dirty="0">
+                          <a:solidFill>
+                            <a:srgbClr val="0000FF"/>
+                          </a:solidFill>
+                          <a:latin typeface="Consolas" panose="020B0609020204030204" pitchFamily="49" charset="0"/>
+                        </a:rPr>
+                        <a:t>Transfer-Encoding: chunked</a:t>
+                      </a:r>
+                    </a:p>
+                    <a:p>
+                      <a:endParaRPr lang="en-US" sz="1600" dirty="0">
+                        <a:solidFill>
+                          <a:srgbClr val="0000FF"/>
+                        </a:solidFill>
+                        <a:latin typeface="Consolas" panose="020B0609020204030204" pitchFamily="49" charset="0"/>
+                      </a:endParaRPr>
+                    </a:p>
+                    <a:p>
+                      <a:r>
+                        <a:rPr lang="en-US" sz="1600" dirty="0">
+                          <a:solidFill>
+                            <a:srgbClr val="0000FF"/>
+                          </a:solidFill>
+                          <a:latin typeface="Consolas" panose="020B0609020204030204" pitchFamily="49" charset="0"/>
+                        </a:rPr>
+                        <a:t>&lt;!DOCTYPE html []&gt;</a:t>
+                      </a:r>
+                    </a:p>
+                    <a:p>
+                      <a:r>
+                        <a:rPr lang="en-US" sz="1600" dirty="0">
+                          <a:solidFill>
+                            <a:srgbClr val="0000FF"/>
+                          </a:solidFill>
+                          <a:latin typeface="Consolas" panose="020B0609020204030204" pitchFamily="49" charset="0"/>
+                        </a:rPr>
+                        <a:t>&lt;html </a:t>
+                      </a:r>
+                      <a:r>
+                        <a:rPr lang="en-US" sz="1600" dirty="0" err="1">
+                          <a:solidFill>
+                            <a:srgbClr val="0000FF"/>
+                          </a:solidFill>
+                          <a:latin typeface="Consolas" panose="020B0609020204030204" pitchFamily="49" charset="0"/>
+                        </a:rPr>
+                        <a:t>lang</a:t>
+                      </a:r>
+                      <a:r>
+                        <a:rPr lang="en-US" sz="1600" dirty="0">
+                          <a:solidFill>
+                            <a:srgbClr val="0000FF"/>
+                          </a:solidFill>
+                          <a:latin typeface="Consolas" panose="020B0609020204030204" pitchFamily="49" charset="0"/>
+                        </a:rPr>
+                        <a:t>="</a:t>
+                      </a:r>
+                      <a:r>
+                        <a:rPr lang="en-US" sz="1600" dirty="0" err="1">
+                          <a:solidFill>
+                            <a:srgbClr val="0000FF"/>
+                          </a:solidFill>
+                          <a:latin typeface="Consolas" panose="020B0609020204030204" pitchFamily="49" charset="0"/>
+                        </a:rPr>
+                        <a:t>en</a:t>
+                      </a:r>
+                      <a:r>
+                        <a:rPr lang="en-US" sz="1600" dirty="0">
+                          <a:solidFill>
+                            <a:srgbClr val="0000FF"/>
+                          </a:solidFill>
+                          <a:latin typeface="Consolas" panose="020B0609020204030204" pitchFamily="49" charset="0"/>
+                        </a:rPr>
+                        <a:t>" </a:t>
+                      </a:r>
+                      <a:r>
+                        <a:rPr lang="en-US" sz="1600" dirty="0" err="1">
+                          <a:solidFill>
+                            <a:srgbClr val="0000FF"/>
+                          </a:solidFill>
+                          <a:latin typeface="Consolas" panose="020B0609020204030204" pitchFamily="49" charset="0"/>
+                        </a:rPr>
+                        <a:t>xmlns</a:t>
+                      </a:r>
+                      <a:r>
+                        <a:rPr lang="en-US" sz="1600" dirty="0">
+                          <a:solidFill>
+                            <a:srgbClr val="0000FF"/>
+                          </a:solidFill>
+                          <a:latin typeface="Consolas" panose="020B0609020204030204" pitchFamily="49" charset="0"/>
+                        </a:rPr>
+                        <a:t>="http://www.w3.org/1999/xhtml"&gt;</a:t>
+                      </a:r>
+                    </a:p>
+                    <a:p>
+                      <a:r>
+                        <a:rPr lang="en-US" sz="1600" dirty="0">
+                          <a:solidFill>
+                            <a:srgbClr val="0000FF"/>
+                          </a:solidFill>
+                          <a:latin typeface="Consolas" panose="020B0609020204030204" pitchFamily="49" charset="0"/>
+                        </a:rPr>
+                        <a:t>  &lt;head&gt;</a:t>
+                      </a:r>
+                    </a:p>
+                    <a:p>
+                      <a:r>
+                        <a:rPr lang="en-US" sz="1600" dirty="0">
+                          <a:solidFill>
+                            <a:srgbClr val="0000FF"/>
+                          </a:solidFill>
+                          <a:latin typeface="Consolas" panose="020B0609020204030204" pitchFamily="49" charset="0"/>
+                        </a:rPr>
+                        <a:t>    &lt;meta charset="utf-8" /&gt;</a:t>
+                      </a:r>
+                    </a:p>
+                    <a:p>
+                      <a:r>
+                        <a:rPr lang="en-US" sz="1600" dirty="0">
+                          <a:solidFill>
+                            <a:srgbClr val="0000FF"/>
+                          </a:solidFill>
+                          <a:latin typeface="Consolas" panose="020B0609020204030204" pitchFamily="49" charset="0"/>
+                        </a:rPr>
+                        <a:t>    &lt;title&gt;Internal Server Error&lt;/title&gt;</a:t>
+                      </a:r>
+                    </a:p>
+                    <a:p>
+                      <a:r>
+                        <a:rPr lang="en-US" sz="1600" dirty="0">
+                          <a:solidFill>
+                            <a:srgbClr val="0000FF"/>
+                          </a:solidFill>
+                          <a:latin typeface="Consolas" panose="020B0609020204030204" pitchFamily="49" charset="0"/>
+                        </a:rPr>
+                        <a:t>    &lt;style&gt;</a:t>
+                      </a:r>
+                    </a:p>
+                    <a:p>
+                      <a:r>
+                        <a:rPr lang="en-US" sz="1600" dirty="0">
+                          <a:solidFill>
+                            <a:srgbClr val="0000FF"/>
+                          </a:solidFill>
+                          <a:latin typeface="Consolas" panose="020B0609020204030204" pitchFamily="49" charset="0"/>
+                        </a:rPr>
+                        <a:t>            body {</a:t>
+                      </a:r>
+                    </a:p>
+                    <a:p>
+                      <a:r>
+                        <a:rPr lang="en-US" sz="1600" dirty="0">
+                          <a:solidFill>
+                            <a:srgbClr val="0000FF"/>
+                          </a:solidFill>
+                          <a:latin typeface="Consolas" panose="020B0609020204030204" pitchFamily="49" charset="0"/>
+                        </a:rPr>
+                        <a:t>    font-family: 'Segoe UI', Tahoma, Arial, Helvetica, sans-serif;</a:t>
+                      </a:r>
+                    </a:p>
+                    <a:p>
+                      <a:r>
+                        <a:rPr lang="en-US" sz="1600" dirty="0">
+                          <a:solidFill>
+                            <a:srgbClr val="0000FF"/>
+                          </a:solidFill>
+                          <a:latin typeface="Consolas" panose="020B0609020204030204" pitchFamily="49" charset="0"/>
+                        </a:rPr>
+                        <a:t>    font-size: .813em;</a:t>
+                      </a:r>
+                    </a:p>
+                  </a:txBody>
+                  <a:tcPr>
+                    <a:lnL w="12700" cap="flat" cmpd="sng" algn="ctr">
+                      <a:solidFill>
+                        <a:sysClr val="window" lastClr="FFFFFF"/>
+                      </a:solidFill>
+                      <a:prstDash val="solid"/>
+                      <a:round/>
+                      <a:headEnd type="none" w="med" len="med"/>
+                      <a:tailEnd type="none" w="med" len="med"/>
+                    </a:lnL>
+                    <a:lnR w="12700" cap="flat" cmpd="sng" algn="ctr">
+                      <a:solidFill>
+                        <a:sysClr val="window" lastClr="FFFFFF"/>
+                      </a:solidFill>
+                      <a:prstDash val="solid"/>
+                      <a:round/>
+                      <a:headEnd type="none" w="med" len="med"/>
+                      <a:tailEnd type="none" w="med" len="med"/>
+                    </a:lnR>
+                    <a:lnT w="12700" cap="flat" cmpd="sng" algn="ctr">
+                      <a:solidFill>
+                        <a:schemeClr val="tx1"/>
+                      </a:solidFill>
+                      <a:prstDash val="solid"/>
+                      <a:round/>
+                      <a:headEnd type="none" w="med" len="med"/>
+                      <a:tailEnd type="none" w="med" len="med"/>
+                    </a:lnT>
+                    <a:lnB w="12700" cap="flat" cmpd="sng" algn="ctr">
+                      <a:solidFill>
+                        <a:sysClr val="window" lastClr="FFFFFF"/>
+                      </a:solidFill>
+                      <a:prstDash val="solid"/>
+                      <a:round/>
+                      <a:headEnd type="none" w="med" len="med"/>
+                      <a:tailEnd type="none" w="med" len="med"/>
+                    </a:lnB>
+                    <a:lnTlToBr w="12700" cmpd="sng">
+                      <a:noFill/>
+                      <a:prstDash val="solid"/>
+                    </a:lnTlToBr>
+                    <a:lnBlToTr w="12700" cmpd="sng">
+                      <a:noFill/>
+                      <a:prstDash val="solid"/>
+                    </a:lnBlToTr>
+                    <a:solidFill>
+                      <a:sysClr val="window" lastClr="FFFFFF"/>
+                    </a:solidFill>
+                  </a:tcPr>
+                </a:tc>
+                <a:extLst>
+                  <a:ext uri="{0D108BD9-81ED-4DB2-BD59-A6C34878D82A}">
+                    <a16:rowId xmlns:a16="http://schemas.microsoft.com/office/drawing/2014/main" val="3473222697"/>
+                  </a:ext>
+                </a:extLst>
+              </a:tr>
+              <a:tr h="362274">
+                <a:tc>
+                  <a:txBody>
+                    <a:bodyPr/>
+                    <a:lstStyle/>
+                    <a:p>
+                      <a:endParaRPr lang="en-US" sz="1600" dirty="0">
+                        <a:solidFill>
+                          <a:srgbClr val="000000"/>
+                        </a:solidFill>
+                        <a:latin typeface="Consolas" panose="020B0609020204030204" pitchFamily="49" charset="0"/>
+                      </a:endParaRPr>
+                    </a:p>
+                  </a:txBody>
+                  <a:tcPr>
+                    <a:lnL w="12700" cap="flat" cmpd="sng" algn="ctr">
+                      <a:solidFill>
+                        <a:sysClr val="window" lastClr="FFFFFF"/>
+                      </a:solidFill>
+                      <a:prstDash val="solid"/>
+                      <a:round/>
+                      <a:headEnd type="none" w="med" len="med"/>
+                      <a:tailEnd type="none" w="med" len="med"/>
+                    </a:lnL>
+                    <a:lnR w="12700" cap="flat" cmpd="sng" algn="ctr">
+                      <a:solidFill>
+                        <a:sysClr val="window" lastClr="FFFFFF"/>
+                      </a:solidFill>
+                      <a:prstDash val="solid"/>
+                      <a:round/>
+                      <a:headEnd type="none" w="med" len="med"/>
+                      <a:tailEnd type="none" w="med" len="med"/>
+                    </a:lnR>
+                    <a:lnT w="12700" cap="flat" cmpd="sng" algn="ctr">
+                      <a:solidFill>
+                        <a:sysClr val="window" lastClr="FFFFFF"/>
+                      </a:solidFill>
+                      <a:prstDash val="solid"/>
+                      <a:round/>
+                      <a:headEnd type="none" w="med" len="med"/>
+                      <a:tailEnd type="none" w="med" len="med"/>
+                    </a:lnT>
+                    <a:lnB w="12700" cap="flat" cmpd="sng" algn="ctr">
+                      <a:solidFill>
+                        <a:sysClr val="window" lastClr="FFFFFF"/>
+                      </a:solidFill>
+                      <a:prstDash val="solid"/>
+                      <a:round/>
+                      <a:headEnd type="none" w="med" len="med"/>
+                      <a:tailEnd type="none" w="med" len="med"/>
+                    </a:lnB>
+                    <a:lnTlToBr w="12700" cmpd="sng">
+                      <a:noFill/>
+                      <a:prstDash val="solid"/>
+                    </a:lnTlToBr>
+                    <a:lnBlToTr w="12700" cmpd="sng">
+                      <a:noFill/>
+                      <a:prstDash val="solid"/>
+                    </a:lnBlToTr>
+                    <a:solidFill>
+                      <a:sysClr val="window" lastClr="FFFFFF"/>
+                    </a:solidFill>
+                  </a:tcPr>
+                </a:tc>
+                <a:extLst>
+                  <a:ext uri="{0D108BD9-81ED-4DB2-BD59-A6C34878D82A}">
+                    <a16:rowId xmlns:a16="http://schemas.microsoft.com/office/drawing/2014/main" val="97062865"/>
+                  </a:ext>
+                </a:extLst>
+              </a:tr>
+            </a:tbl>
+          </a:graphicData>
+        </a:graphic>
+      </p:graphicFrame>
+      <p:sp>
+        <p:nvSpPr>
+          <p:cNvPr id="8" name="Rectangle 7">
+            <a:extLst>
+              <a:ext uri="{FF2B5EF4-FFF2-40B4-BE49-F238E27FC236}">
+                <a16:creationId xmlns:a16="http://schemas.microsoft.com/office/drawing/2014/main" id="{4C97B6E7-EB3E-4FB8-9315-7B6EC6471E23}"/>
+              </a:ext>
+            </a:extLst>
+          </p:cNvPr>
+          <p:cNvSpPr/>
+          <p:nvPr/>
+        </p:nvSpPr>
+        <p:spPr>
+          <a:xfrm>
+            <a:off x="3354806" y="1370995"/>
+            <a:ext cx="1978891" cy="446567"/>
+          </a:xfrm>
+          <a:prstGeom prst="rect">
+            <a:avLst/>
+          </a:prstGeom>
+          <a:solidFill>
+            <a:schemeClr val="accent1"/>
+          </a:solidFill>
+          <a:ln w="6350" cap="flat" cmpd="sng" algn="ctr">
+            <a:solidFill>
+              <a:schemeClr val="bg1"/>
+            </a:solidFill>
+            <a:prstDash val="solid"/>
+            <a:miter lim="800000"/>
+          </a:ln>
+          <a:effectLst/>
+        </p:spPr>
+        <p:txBody>
+          <a:bodyPr rtlCol="0" anchor="ctr"/>
+          <a:lstStyle/>
+          <a:p>
+            <a:pPr marL="0" marR="0" lvl="0" indent="0" defTabSz="914400" eaLnBrk="1" fontAlgn="auto" latinLnBrk="0" hangingPunct="1">
+              <a:lnSpc>
+                <a:spcPct val="100000"/>
+              </a:lnSpc>
+              <a:spcBef>
+                <a:spcPts val="0"/>
+              </a:spcBef>
+              <a:spcAft>
+                <a:spcPts val="0"/>
+              </a:spcAft>
+              <a:buClrTx/>
+              <a:buSzTx/>
+              <a:buFontTx/>
+              <a:buNone/>
+              <a:tabLst/>
+              <a:defRPr/>
+            </a:pPr>
+            <a:r>
+              <a:rPr lang="en-US" b="1" kern="0" dirty="0" err="1">
+                <a:solidFill>
+                  <a:schemeClr val="bg1"/>
+                </a:solidFill>
+                <a:latin typeface="Segoe UI Light"/>
+              </a:rPr>
+              <a:t>cmd</a:t>
+            </a:r>
+            <a:r>
+              <a:rPr lang="en-US" b="1" kern="0" dirty="0">
+                <a:solidFill>
+                  <a:schemeClr val="bg1"/>
+                </a:solidFill>
+                <a:latin typeface="Segoe UI Light"/>
+              </a:rPr>
+              <a:t> - </a:t>
+            </a:r>
+            <a:r>
+              <a:rPr lang="en-US" b="1" kern="0" dirty="0" err="1">
+                <a:solidFill>
+                  <a:schemeClr val="bg1"/>
+                </a:solidFill>
+                <a:latin typeface="Segoe UI Light"/>
+              </a:rPr>
+              <a:t>httprepl</a:t>
+            </a:r>
+            <a:r>
+              <a:rPr lang="en-US" b="1" kern="0" dirty="0">
+                <a:solidFill>
+                  <a:schemeClr val="bg1"/>
+                </a:solidFill>
+                <a:latin typeface="Segoe UI Light"/>
+              </a:rPr>
+              <a:t>    </a:t>
+            </a:r>
+            <a:endParaRPr kumimoji="0" lang="en-US" sz="1800" i="0" u="none" strike="noStrike" kern="0" cap="none" spc="0" normalizeH="0" baseline="0" noProof="0" dirty="0">
+              <a:ln>
+                <a:noFill/>
+              </a:ln>
+              <a:solidFill>
+                <a:schemeClr val="bg1"/>
+              </a:solidFill>
+              <a:effectLst/>
+              <a:uLnTx/>
+              <a:uFillTx/>
+              <a:latin typeface="Arial" panose="020B0604020202020204" pitchFamily="34" charset="0"/>
+              <a:cs typeface="Arial" panose="020B0604020202020204" pitchFamily="34" charset="0"/>
+            </a:endParaRPr>
+          </a:p>
+        </p:txBody>
+      </p:sp>
+      <p:sp>
+        <p:nvSpPr>
+          <p:cNvPr id="9" name="Rectangle 8">
+            <a:extLst>
+              <a:ext uri="{FF2B5EF4-FFF2-40B4-BE49-F238E27FC236}">
+                <a16:creationId xmlns:a16="http://schemas.microsoft.com/office/drawing/2014/main" id="{B933A772-4FC9-4731-9A2E-D30B074C8C17}"/>
+              </a:ext>
+            </a:extLst>
+          </p:cNvPr>
+          <p:cNvSpPr/>
+          <p:nvPr/>
+        </p:nvSpPr>
+        <p:spPr bwMode="auto">
+          <a:xfrm>
+            <a:off x="9164286" y="1755407"/>
+            <a:ext cx="2241650" cy="446567"/>
+          </a:xfrm>
+          <a:prstGeom prst="rect">
+            <a:avLst/>
+          </a:prstGeom>
+          <a:noFill/>
+          <a:ln w="38100">
+            <a:solidFill>
+              <a:schemeClr val="tx2"/>
+            </a:solidFill>
+            <a:headEnd type="none" w="med" len="med"/>
+            <a:tailEnd type="none" w="med" len="med"/>
+          </a:ln>
+          <a:effectLst/>
+        </p:spPr>
+        <p:style>
+          <a:lnRef idx="1">
+            <a:schemeClr val="accent2"/>
+          </a:lnRef>
+          <a:fillRef idx="3">
+            <a:schemeClr val="accent2"/>
+          </a:fillRef>
+          <a:effectRef idx="2">
+            <a:schemeClr val="accent2"/>
+          </a:effectRef>
+          <a:fontRef idx="minor">
+            <a:schemeClr val="lt1"/>
+          </a:fontRef>
+        </p:style>
+        <p:txBody>
+          <a:bodyPr rot="0" spcFirstLastPara="0" vertOverflow="overflow" horzOverflow="overflow" vert="horz" wrap="square" lIns="182880" tIns="146304" rIns="182880" bIns="146304" numCol="1" spcCol="0" rtlCol="0" fromWordArt="0" anchor="t" anchorCtr="0" forceAA="0" compatLnSpc="1">
+            <a:prstTxWarp prst="textNoShape">
+              <a:avLst/>
+            </a:prstTxWarp>
+            <a:noAutofit/>
+          </a:bodyPr>
+          <a:lstStyle/>
+          <a:p>
+            <a:pPr algn="ctr" defTabSz="932472" fontAlgn="base">
+              <a:lnSpc>
+                <a:spcPct val="90000"/>
+              </a:lnSpc>
+              <a:spcBef>
+                <a:spcPct val="0"/>
+              </a:spcBef>
+              <a:spcAft>
+                <a:spcPct val="0"/>
+              </a:spcAft>
+            </a:pPr>
+            <a:endParaRPr lang="en-US" sz="2400" dirty="0" err="1">
+              <a:gradFill>
+                <a:gsLst>
+                  <a:gs pos="0">
+                    <a:srgbClr val="FFFFFF"/>
+                  </a:gs>
+                  <a:gs pos="100000">
+                    <a:srgbClr val="FFFFFF"/>
+                  </a:gs>
+                </a:gsLst>
+                <a:lin ang="5400000" scaled="0"/>
+              </a:gradFill>
+              <a:ea typeface="Segoe UI" pitchFamily="34" charset="0"/>
+              <a:cs typeface="Segoe UI" pitchFamily="34" charset="0"/>
+            </a:endParaRPr>
+          </a:p>
+        </p:txBody>
+      </p:sp>
+    </p:spTree>
+    <p:extLst>
+      <p:ext uri="{BB962C8B-B14F-4D97-AF65-F5344CB8AC3E}">
+        <p14:creationId xmlns:p14="http://schemas.microsoft.com/office/powerpoint/2010/main" val="1448531206"/>
+      </p:ext>
+    </p:extLst>
+  </p:cSld>
+  <p:clrMapOvr>
+    <a:masterClrMapping/>
+  </p:clrMapOvr>
+  <p:transition>
+    <p:fade/>
+  </p:transition>
+  <p:timing>
+    <p:tnLst>
+      <p:par>
+        <p:cTn id="1" dur="indefinite" restart="never" nodeType="tmRoot">
+          <p:childTnLst>
+            <p:seq concurrent="1" nextAc="seek">
+              <p:cTn id="2" dur="indefinite" nodeType="mainSeq">
+                <p:childTnLst>
+                  <p:par>
+                    <p:cTn id="3" fill="hold">
+                      <p:stCondLst>
+                        <p:cond delay="indefinite"/>
+                      </p:stCondLst>
+                      <p:childTnLst>
+                        <p:par>
+                          <p:cTn id="4" fill="hold">
+                            <p:stCondLst>
+                              <p:cond delay="0"/>
+                            </p:stCondLst>
+                            <p:childTnLst>
+                              <p:par>
+                                <p:cTn id="5" presetID="1" presetClass="entr" presetSubtype="0" fill="hold" grpId="0" nodeType="clickEffect">
+                                  <p:stCondLst>
+                                    <p:cond delay="0"/>
+                                  </p:stCondLst>
+                                  <p:childTnLst>
+                                    <p:set>
+                                      <p:cBhvr>
+                                        <p:cTn id="6" dur="1" fill="hold">
+                                          <p:stCondLst>
+                                            <p:cond delay="0"/>
+                                          </p:stCondLst>
+                                        </p:cTn>
+                                        <p:tgtEl>
+                                          <p:spTgt spid="9"/>
+                                        </p:tgtEl>
+                                        <p:attrNameLst>
+                                          <p:attrName>style.visibility</p:attrName>
+                                        </p:attrNameLst>
+                                      </p:cBhvr>
+                                      <p:to>
+                                        <p:strVal val="visible"/>
+                                      </p:to>
+                                    </p:set>
+                                  </p:childTnLst>
+                                </p:cTn>
+                              </p:par>
+                              <p:par>
+                                <p:cTn id="7" presetID="26" presetClass="emph" presetSubtype="0" fill="hold" grpId="1" nodeType="withEffect">
+                                  <p:stCondLst>
+                                    <p:cond delay="0"/>
+                                  </p:stCondLst>
+                                  <p:childTnLst>
+                                    <p:animEffect transition="out" filter="fade">
+                                      <p:cBhvr>
+                                        <p:cTn id="8" dur="500" tmFilter="0, 0; .2, .5; .8, .5; 1, 0"/>
+                                        <p:tgtEl>
+                                          <p:spTgt spid="9"/>
+                                        </p:tgtEl>
+                                      </p:cBhvr>
+                                    </p:animEffect>
+                                    <p:animScale>
+                                      <p:cBhvr>
+                                        <p:cTn id="9" dur="250" autoRev="1" fill="hold"/>
+                                        <p:tgtEl>
+                                          <p:spTgt spid="9"/>
+                                        </p:tgtEl>
+                                      </p:cBhvr>
+                                      <p:by x="105000" y="105000"/>
+                                    </p:animScale>
+                                  </p:childTnLst>
+                                </p:cTn>
+                              </p:par>
+                            </p:childTnLst>
+                          </p:cTn>
+                        </p:par>
+                      </p:childTnLst>
+                    </p:cTn>
+                  </p:par>
+                </p:childTnLst>
+              </p:cTn>
+              <p:prevCondLst>
+                <p:cond evt="onPrev" delay="0">
+                  <p:tgtEl>
+                    <p:sldTgt/>
+                  </p:tgtEl>
+                </p:cond>
+              </p:prevCondLst>
+              <p:nextCondLst>
+                <p:cond evt="onNext" delay="0">
+                  <p:tgtEl>
+                    <p:sldTgt/>
+                  </p:tgtEl>
+                </p:cond>
+              </p:nextCondLst>
+            </p:seq>
+          </p:childTnLst>
+        </p:cTn>
+      </p:par>
+    </p:tnLst>
+    <p:bldLst>
+      <p:bldP spid="9" grpId="0" animBg="1"/>
+      <p:bldP spid="9" grpId="1" animBg="1"/>
+    </p:bldLst>
+  </p:timing>
+</p:sld>
+</file>
+
+<file path=ppt/slides/slide15.xml><?xml version="1.0" encoding="utf-8"?>
+<p:sld xmlns:a="http://schemas.openxmlformats.org/drawingml/2006/main" xmlns:r="http://schemas.openxmlformats.org/officeDocument/2006/relationships" xmlns:p="http://schemas.openxmlformats.org/presentationml/2006/main">
+  <p:cSld>
+    <p:spTree>
+      <p:nvGrpSpPr>
+        <p:cNvPr id="1" name=""/>
+        <p:cNvGrpSpPr/>
+        <p:nvPr/>
+      </p:nvGrpSpPr>
+      <p:grpSpPr>
+        <a:xfrm>
+          <a:off x="0" y="0"/>
+          <a:ext cx="0" cy="0"/>
+          <a:chOff x="0" y="0"/>
+          <a:chExt cx="0" cy="0"/>
+        </a:xfrm>
+      </p:grpSpPr>
+      <p:sp>
+        <p:nvSpPr>
+          <p:cNvPr id="2" name="Text Placeholder 1">
+            <a:extLst>
+              <a:ext uri="{FF2B5EF4-FFF2-40B4-BE49-F238E27FC236}">
+                <a16:creationId xmlns:a16="http://schemas.microsoft.com/office/drawing/2014/main" id="{2FB59DA8-289E-4014-856D-BBB188489147}"/>
+              </a:ext>
+            </a:extLst>
+          </p:cNvPr>
+          <p:cNvSpPr>
+            <a:spLocks noGrp="1"/>
+          </p:cNvSpPr>
+          <p:nvPr>
+            <p:ph type="body" sz="quarter" idx="10"/>
+          </p:nvPr>
+        </p:nvSpPr>
+        <p:spPr>
+          <a:xfrm>
+            <a:off x="269239" y="1189177"/>
+            <a:ext cx="11653523" cy="2718821"/>
+          </a:xfrm>
+        </p:spPr>
+        <p:txBody>
+          <a:bodyPr/>
+          <a:lstStyle/>
+          <a:p>
+            <a:r>
+              <a:rPr lang="en-US" dirty="0"/>
+              <a:t>Contract-based RPC services</a:t>
+            </a:r>
+          </a:p>
+          <a:p>
+            <a:r>
+              <a:rPr lang="en-US" dirty="0"/>
+              <a:t>Messages sent/received via HTTP/2</a:t>
+            </a:r>
+          </a:p>
+          <a:p>
+            <a:r>
+              <a:rPr lang="en-US" dirty="0"/>
+              <a:t>Services &amp; messages defined with </a:t>
+            </a:r>
+            <a:r>
+              <a:rPr lang="en-US" dirty="0" err="1"/>
+              <a:t>Protobuf</a:t>
+            </a:r>
+            <a:endParaRPr lang="en-US" dirty="0"/>
+          </a:p>
+          <a:p>
+            <a:r>
+              <a:rPr lang="en-US" dirty="0"/>
+              <a:t>Binary serialization</a:t>
+            </a:r>
+          </a:p>
+        </p:txBody>
+      </p:sp>
+      <p:sp>
+        <p:nvSpPr>
+          <p:cNvPr id="3" name="Title 2">
+            <a:extLst>
+              <a:ext uri="{FF2B5EF4-FFF2-40B4-BE49-F238E27FC236}">
+                <a16:creationId xmlns:a16="http://schemas.microsoft.com/office/drawing/2014/main" id="{6A0DE05F-17CB-4555-8453-8ADAF3852B5E}"/>
+              </a:ext>
+            </a:extLst>
+          </p:cNvPr>
+          <p:cNvSpPr>
+            <a:spLocks noGrp="1"/>
+          </p:cNvSpPr>
+          <p:nvPr>
+            <p:ph type="title"/>
+          </p:nvPr>
+        </p:nvSpPr>
+        <p:spPr/>
+        <p:txBody>
+          <a:bodyPr/>
+          <a:lstStyle/>
+          <a:p>
+            <a:r>
+              <a:rPr lang="en-US" dirty="0" err="1"/>
+              <a:t>gRPC</a:t>
+            </a:r>
+            <a:endParaRPr lang="en-US" dirty="0"/>
+          </a:p>
+        </p:txBody>
+      </p:sp>
+    </p:spTree>
+    <p:extLst>
+      <p:ext uri="{BB962C8B-B14F-4D97-AF65-F5344CB8AC3E}">
+        <p14:creationId xmlns:p14="http://schemas.microsoft.com/office/powerpoint/2010/main" val="3306291437"/>
+      </p:ext>
+    </p:extLst>
+  </p:cSld>
+  <p:clrMapOvr>
+    <a:masterClrMapping/>
+  </p:clrMapOvr>
+  <p:transition>
+    <p:fade/>
+  </p:transition>
+</p:sld>
+</file>
+
+<file path=ppt/slides/slide16.xml><?xml version="1.0" encoding="utf-8"?>
+<p:sld xmlns:a="http://schemas.openxmlformats.org/drawingml/2006/main" xmlns:r="http://schemas.openxmlformats.org/officeDocument/2006/relationships" xmlns:p="http://schemas.openxmlformats.org/presentationml/2006/main">
+  <p:cSld>
+    <p:spTree>
+      <p:nvGrpSpPr>
+        <p:cNvPr id="1" name=""/>
+        <p:cNvGrpSpPr/>
+        <p:nvPr/>
+      </p:nvGrpSpPr>
+      <p:grpSpPr>
+        <a:xfrm>
+          <a:off x="0" y="0"/>
+          <a:ext cx="0" cy="0"/>
+          <a:chOff x="0" y="0"/>
+          <a:chExt cx="0" cy="0"/>
+        </a:xfrm>
+      </p:grpSpPr>
+      <p:sp>
+        <p:nvSpPr>
+          <p:cNvPr id="2" name="Text Placeholder 1">
+            <a:extLst>
+              <a:ext uri="{FF2B5EF4-FFF2-40B4-BE49-F238E27FC236}">
+                <a16:creationId xmlns:a16="http://schemas.microsoft.com/office/drawing/2014/main" id="{4AE3E37F-1BDC-4D85-A727-04C9469BE69D}"/>
+              </a:ext>
+            </a:extLst>
+          </p:cNvPr>
+          <p:cNvSpPr>
+            <a:spLocks noGrp="1"/>
+          </p:cNvSpPr>
+          <p:nvPr>
+            <p:ph type="body" sz="quarter" idx="10"/>
+          </p:nvPr>
+        </p:nvSpPr>
+        <p:spPr/>
+        <p:txBody>
+          <a:bodyPr/>
+          <a:lstStyle/>
+          <a:p>
+            <a:endParaRPr lang="en-US"/>
+          </a:p>
+        </p:txBody>
+      </p:sp>
+      <p:sp>
+        <p:nvSpPr>
+          <p:cNvPr id="3" name="Title 2">
+            <a:extLst>
+              <a:ext uri="{FF2B5EF4-FFF2-40B4-BE49-F238E27FC236}">
+                <a16:creationId xmlns:a16="http://schemas.microsoft.com/office/drawing/2014/main" id="{3AD40945-7137-4CD0-806E-2E84443AE3C9}"/>
+              </a:ext>
+            </a:extLst>
+          </p:cNvPr>
+          <p:cNvSpPr>
+            <a:spLocks noGrp="1"/>
+          </p:cNvSpPr>
+          <p:nvPr>
+            <p:ph type="title"/>
+          </p:nvPr>
+        </p:nvSpPr>
+        <p:spPr/>
+        <p:txBody>
+          <a:bodyPr/>
+          <a:lstStyle/>
+          <a:p>
+            <a:r>
+              <a:rPr lang="en-US" dirty="0"/>
+              <a:t>Worker services</a:t>
+            </a:r>
+          </a:p>
+        </p:txBody>
+      </p:sp>
+    </p:spTree>
+    <p:extLst>
+      <p:ext uri="{BB962C8B-B14F-4D97-AF65-F5344CB8AC3E}">
+        <p14:creationId xmlns:p14="http://schemas.microsoft.com/office/powerpoint/2010/main" val="1309410027"/>
+      </p:ext>
+    </p:extLst>
+  </p:cSld>
+  <p:clrMapOvr>
+    <a:masterClrMapping/>
+  </p:clrMapOvr>
+  <p:transition>
+    <p:fade/>
+  </p:transition>
+</p:sld>
+</file>
+
+<file path=ppt/slides/slide17.xml><?xml version="1.0" encoding="utf-8"?>
 <p:sld xmlns:a="http://schemas.openxmlformats.org/drawingml/2006/main" xmlns:r="http://schemas.openxmlformats.org/officeDocument/2006/relationships" xmlns:p="http://schemas.openxmlformats.org/presentationml/2006/main">
   <p:cSld>
     <p:spTree>
@@ -13983,7 +17197,7 @@
 </p:sld>
 </file>
 
-<file path=ppt/slides/slide14.xml><?xml version="1.0" encoding="utf-8"?>
+<file path=ppt/slides/slide18.xml><?xml version="1.0" encoding="utf-8"?>
 <p:sld xmlns:a="http://schemas.openxmlformats.org/drawingml/2006/main" xmlns:r="http://schemas.openxmlformats.org/officeDocument/2006/relationships" xmlns:p="http://schemas.openxmlformats.org/presentationml/2006/main">
   <p:cSld>
     <p:spTree>
@@ -14123,7 +17337,7 @@
 </p:sld>
 </file>
 
-<file path=ppt/slides/slide15.xml><?xml version="1.0" encoding="utf-8"?>
+<file path=ppt/slides/slide19.xml><?xml version="1.0" encoding="utf-8"?>
 <p:sld xmlns:a="http://schemas.openxmlformats.org/drawingml/2006/main" xmlns:r="http://schemas.openxmlformats.org/officeDocument/2006/relationships" xmlns:p="http://schemas.openxmlformats.org/presentationml/2006/main">
   <p:cSld>
     <p:spTree>
@@ -14163,7 +17377,7 @@
           <a:p>
             <a:r>
               <a:rPr lang="en-US" dirty="0"/>
-              <a:t>Demo intro slide</a:t>
+              <a:t>Demo</a:t>
             </a:r>
           </a:p>
         </p:txBody>
@@ -16130,6 +19344,32 @@
                                   </p:childTnLst>
                                 </p:cTn>
                               </p:par>
+                              <p:par>
+                                <p:cTn id="11" presetID="26" presetClass="emph" presetSubtype="0" fill="hold" grpId="1" nodeType="withEffect">
+                                  <p:stCondLst>
+                                    <p:cond delay="0"/>
+                                  </p:stCondLst>
+                                  <p:childTnLst>
+                                    <p:animEffect transition="out" filter="fade">
+                                      <p:cBhvr>
+                                        <p:cTn id="12" dur="500" tmFilter="0, 0; .2, .5; .8, .5; 1, 0"/>
+                                        <p:tgtEl>
+                                          <p:spTgt spid="6"/>
+                                        </p:tgtEl>
+                                      </p:cBhvr>
+                                    </p:animEffect>
+                                    <p:animScale>
+                                      <p:cBhvr>
+                                        <p:cTn id="13" dur="250" autoRev="1" fill="hold"/>
+                                        <p:tgtEl>
+                                          <p:spTgt spid="6"/>
+                                        </p:tgtEl>
+                                      </p:cBhvr>
+                                      <p:by x="105000" y="105000"/>
+                                    </p:animScale>
+                                  </p:childTnLst>
+                                </p:cTn>
+                              </p:par>
                             </p:childTnLst>
                           </p:cTn>
                         </p:par>
@@ -16159,6 +19399,7 @@
     </p:tnLst>
     <p:bldLst>
       <p:bldP spid="6" grpId="0" animBg="1"/>
+      <p:bldP spid="6" grpId="1" animBg="1"/>
     </p:bldLst>
   </p:timing>
 </p:sld>
@@ -16678,12 +19919,112 @@
           <a:chExt cx="0" cy="0"/>
         </a:xfrm>
       </p:grpSpPr>
+      <p:sp>
+        <p:nvSpPr>
+          <p:cNvPr id="2" name="Text Placeholder 1">
+            <a:extLst>
+              <a:ext uri="{FF2B5EF4-FFF2-40B4-BE49-F238E27FC236}">
+                <a16:creationId xmlns:a16="http://schemas.microsoft.com/office/drawing/2014/main" id="{9854F6B1-9A29-47D2-8AA6-EA9FFD02BA9D}"/>
+              </a:ext>
+            </a:extLst>
+          </p:cNvPr>
+          <p:cNvSpPr>
+            <a:spLocks noGrp="1"/>
+          </p:cNvSpPr>
+          <p:nvPr>
+            <p:ph type="body" sz="quarter" idx="10"/>
+          </p:nvPr>
+        </p:nvSpPr>
+        <p:spPr>
+          <a:xfrm>
+            <a:off x="269239" y="1189177"/>
+            <a:ext cx="11653523" cy="4046236"/>
+          </a:xfrm>
+        </p:spPr>
+        <p:txBody>
+          <a:bodyPr/>
+          <a:lstStyle/>
+          <a:p>
+            <a:r>
+              <a:rPr lang="en-US" dirty="0"/>
+              <a:t>Json.NET</a:t>
+            </a:r>
+          </a:p>
+          <a:p>
+            <a:r>
+              <a:rPr lang="en-US" dirty="0" err="1"/>
+              <a:t>Microsoft.AspNet.WebApi.Client</a:t>
+            </a:r>
+            <a:endParaRPr lang="en-US" dirty="0"/>
+          </a:p>
+          <a:p>
+            <a:r>
+              <a:rPr lang="en-US" dirty="0"/>
+              <a:t>Roslyn (</a:t>
+            </a:r>
+            <a:r>
+              <a:rPr lang="en-US" dirty="0" err="1"/>
+              <a:t>Microsoft.CodeAnalysis</a:t>
+            </a:r>
+            <a:r>
+              <a:rPr lang="en-US" dirty="0"/>
+              <a:t>.*)</a:t>
+            </a:r>
+          </a:p>
+          <a:p>
+            <a:r>
+              <a:rPr lang="en-US" dirty="0"/>
+              <a:t>EF Core</a:t>
+            </a:r>
+          </a:p>
+          <a:p>
+            <a:r>
+              <a:rPr lang="en-US" dirty="0"/>
+              <a:t>Social auth</a:t>
+            </a:r>
+          </a:p>
+          <a:p>
+            <a:r>
+              <a:rPr lang="en-US" dirty="0"/>
+              <a:t>Node Services &amp; SPA Services</a:t>
+            </a:r>
+          </a:p>
+        </p:txBody>
+      </p:sp>
+      <p:sp>
+        <p:nvSpPr>
+          <p:cNvPr id="3" name="Title 2">
+            <a:extLst>
+              <a:ext uri="{FF2B5EF4-FFF2-40B4-BE49-F238E27FC236}">
+                <a16:creationId xmlns:a16="http://schemas.microsoft.com/office/drawing/2014/main" id="{4D6FEFBB-5DFC-4490-BA6A-1BC45DEA5EC8}"/>
+              </a:ext>
+            </a:extLst>
+          </p:cNvPr>
+          <p:cNvSpPr>
+            <a:spLocks noGrp="1"/>
+          </p:cNvSpPr>
+          <p:nvPr>
+            <p:ph type="title"/>
+          </p:nvPr>
+        </p:nvSpPr>
+        <p:spPr/>
+        <p:txBody>
+          <a:bodyPr/>
+          <a:lstStyle/>
+          <a:p>
+            <a:r>
+              <a:rPr lang="en-US" dirty="0"/>
+              <a:t>Assemblies removed from Shared Framework</a:t>
+            </a:r>
+          </a:p>
+        </p:txBody>
+      </p:sp>
       <p:pic>
         <p:nvPicPr>
-          <p:cNvPr id="5" name="Picture 4">
+          <p:cNvPr id="6" name="Picture 5" descr="A picture containing text&#10;&#10;Description automatically generated">
             <a:extLst>
               <a:ext uri="{FF2B5EF4-FFF2-40B4-BE49-F238E27FC236}">
-                <a16:creationId xmlns:a16="http://schemas.microsoft.com/office/drawing/2014/main" id="{322ECF8B-90CC-4D40-A3C1-FE086BE55D19}"/>
+                <a16:creationId xmlns:a16="http://schemas.microsoft.com/office/drawing/2014/main" id="{11B705AC-092B-4594-A799-E45B35B9B085}"/>
               </a:ext>
             </a:extLst>
           </p:cNvPr>
@@ -16706,107 +20047,14 @@
         </p:blipFill>
         <p:spPr>
           <a:xfrm>
-            <a:off x="5663281" y="2963863"/>
-            <a:ext cx="6350000" cy="3810000"/>
+            <a:off x="9941442" y="4692177"/>
+            <a:ext cx="2037833" cy="2005486"/>
           </a:xfrm>
           <a:prstGeom prst="rect">
             <a:avLst/>
           </a:prstGeom>
         </p:spPr>
       </p:pic>
-      <p:sp>
-        <p:nvSpPr>
-          <p:cNvPr id="2" name="Text Placeholder 1">
-            <a:extLst>
-              <a:ext uri="{FF2B5EF4-FFF2-40B4-BE49-F238E27FC236}">
-                <a16:creationId xmlns:a16="http://schemas.microsoft.com/office/drawing/2014/main" id="{9854F6B1-9A29-47D2-8AA6-EA9FFD02BA9D}"/>
-              </a:ext>
-            </a:extLst>
-          </p:cNvPr>
-          <p:cNvSpPr>
-            <a:spLocks noGrp="1"/>
-          </p:cNvSpPr>
-          <p:nvPr>
-            <p:ph type="body" sz="quarter" idx="10"/>
-          </p:nvPr>
-        </p:nvSpPr>
-        <p:spPr>
-          <a:xfrm>
-            <a:off x="269239" y="1189177"/>
-            <a:ext cx="11653523" cy="3382529"/>
-          </a:xfrm>
-        </p:spPr>
-        <p:txBody>
-          <a:bodyPr/>
-          <a:lstStyle/>
-          <a:p>
-            <a:r>
-              <a:rPr lang="en-US" dirty="0"/>
-              <a:t>Json.NET</a:t>
-            </a:r>
-          </a:p>
-          <a:p>
-            <a:r>
-              <a:rPr lang="en-US" dirty="0"/>
-              <a:t>Roslyn (</a:t>
-            </a:r>
-            <a:r>
-              <a:rPr lang="en-US" dirty="0" err="1"/>
-              <a:t>Microsoft.CodeAnalysis</a:t>
-            </a:r>
-            <a:r>
-              <a:rPr lang="en-US" dirty="0"/>
-              <a:t>.*)</a:t>
-            </a:r>
-          </a:p>
-          <a:p>
-            <a:r>
-              <a:rPr lang="en-US" dirty="0"/>
-              <a:t>EF Core</a:t>
-            </a:r>
-          </a:p>
-          <a:p>
-            <a:r>
-              <a:rPr lang="en-US" dirty="0"/>
-              <a:t>Social auth</a:t>
-            </a:r>
-          </a:p>
-          <a:p>
-            <a:r>
-              <a:rPr lang="en-US" dirty="0"/>
-              <a:t>Node Services &amp; SPA Services</a:t>
-            </a:r>
-          </a:p>
-        </p:txBody>
-      </p:sp>
-      <p:sp>
-        <p:nvSpPr>
-          <p:cNvPr id="3" name="Title 2">
-            <a:extLst>
-              <a:ext uri="{FF2B5EF4-FFF2-40B4-BE49-F238E27FC236}">
-                <a16:creationId xmlns:a16="http://schemas.microsoft.com/office/drawing/2014/main" id="{4D6FEFBB-5DFC-4490-BA6A-1BC45DEA5EC8}"/>
-              </a:ext>
-            </a:extLst>
-          </p:cNvPr>
-          <p:cNvSpPr>
-            <a:spLocks noGrp="1"/>
-          </p:cNvSpPr>
-          <p:nvPr>
-            <p:ph type="title"/>
-          </p:nvPr>
-        </p:nvSpPr>
-        <p:spPr/>
-        <p:txBody>
-          <a:bodyPr/>
-          <a:lstStyle/>
-          <a:p>
-            <a:r>
-              <a:rPr lang="en-US" dirty="0"/>
-              <a:t>Assemblies removed from Shared Framework</a:t>
-            </a:r>
-          </a:p>
-        </p:txBody>
-      </p:sp>
     </p:spTree>
     <p:extLst>
       <p:ext uri="{BB962C8B-B14F-4D97-AF65-F5344CB8AC3E}">
@@ -18538,6 +21786,33 @@
 </file>
 
 <file path=customXml/item1.xml><?xml version="1.0" encoding="utf-8"?>
+<?mso-contentType ?>
+<FormTemplates xmlns="http://schemas.microsoft.com/sharepoint/v3/contenttype/forms">
+  <Display>DocumentLibraryForm</Display>
+  <Edit>DocumentLibraryForm</Edit>
+  <New>DocumentLibraryForm</New>
+</FormTemplates>
+</file>
+
+<file path=customXml/item2.xml><?xml version="1.0" encoding="utf-8"?>
+<p:properties xmlns:p="http://schemas.microsoft.com/office/2006/metadata/properties" xmlns:xsi="http://www.w3.org/2001/XMLSchema-instance" xmlns:pc="http://schemas.microsoft.com/office/infopath/2007/PartnerControls">
+  <documentManagement>
+    <_ip_UnifiedCompliancePolicyProperties xmlns="http://schemas.microsoft.com/sharepoint/v3" xsi:nil="true"/>
+    <_ip_UnifiedCompliancePolicyUIAction xmlns="http://schemas.microsoft.com/sharepoint/v3" xsi:nil="true"/>
+    <LastSharedByUser xmlns="11245976-3b4d-4794-a754-317688483df2">jogallow@microsoft.com</LastSharedByUser>
+    <SharedWithUsers xmlns="11245976-3b4d-4794-a754-317688483df2">
+      <UserInfo>
+        <DisplayName>Martin Woodward</DisplayName>
+        <AccountId>67</AccountId>
+        <AccountType/>
+      </UserInfo>
+    </SharedWithUsers>
+    <LastSharedByTime xmlns="11245976-3b4d-4794-a754-317688483df2">2018-03-16T04:12:59+00:00</LastSharedByTime>
+  </documentManagement>
+</p:properties>
+</file>
+
+<file path=customXml/item3.xml><?xml version="1.0" encoding="utf-8"?>
 <ct:contentTypeSchema xmlns:ct="http://schemas.microsoft.com/office/2006/metadata/contentType" xmlns:ma="http://schemas.microsoft.com/office/2006/metadata/properties/metaAttributes" ct:_="" ma:_="" ma:contentTypeName="Document" ma:contentTypeID="0x01010022F88B0CCF1BBA489747F146E6B5E06D" ma:contentTypeVersion="11" ma:contentTypeDescription="Create a new document." ma:contentTypeScope="" ma:versionID="4679f38185fefde8b23806f702b522cc">
   <xsd:schema xmlns:xsd="http://www.w3.org/2001/XMLSchema" xmlns:xs="http://www.w3.org/2001/XMLSchema" xmlns:p="http://schemas.microsoft.com/office/2006/metadata/properties" xmlns:ns1="http://schemas.microsoft.com/sharepoint/v3" xmlns:ns2="569b343d-e775-480b-9b2b-6a6986deb9b0" xmlns:ns3="11245976-3b4d-4794-a754-317688483df2" targetNamespace="http://schemas.microsoft.com/office/2006/metadata/properties" ma:root="true" ma:fieldsID="366371b317520ec9a5ad3c1303c823ef" ns1:_="" ns2:_="" ns3:_="">
     <xsd:import namespace="http://schemas.microsoft.com/sharepoint/v3"/>
@@ -18751,49 +22026,10 @@
 </ct:contentTypeSchema>
 </file>
 
-<file path=customXml/item2.xml><?xml version="1.0" encoding="utf-8"?>
-<p:properties xmlns:p="http://schemas.microsoft.com/office/2006/metadata/properties" xmlns:xsi="http://www.w3.org/2001/XMLSchema-instance" xmlns:pc="http://schemas.microsoft.com/office/infopath/2007/PartnerControls">
-  <documentManagement>
-    <_ip_UnifiedCompliancePolicyProperties xmlns="http://schemas.microsoft.com/sharepoint/v3" xsi:nil="true"/>
-    <_ip_UnifiedCompliancePolicyUIAction xmlns="http://schemas.microsoft.com/sharepoint/v3" xsi:nil="true"/>
-    <LastSharedByUser xmlns="11245976-3b4d-4794-a754-317688483df2">jogallow@microsoft.com</LastSharedByUser>
-    <SharedWithUsers xmlns="11245976-3b4d-4794-a754-317688483df2">
-      <UserInfo>
-        <DisplayName>Martin Woodward</DisplayName>
-        <AccountId>67</AccountId>
-        <AccountType/>
-      </UserInfo>
-    </SharedWithUsers>
-    <LastSharedByTime xmlns="11245976-3b4d-4794-a754-317688483df2">2018-03-16T04:12:59+00:00</LastSharedByTime>
-  </documentManagement>
-</p:properties>
-</file>
-
-<file path=customXml/item3.xml><?xml version="1.0" encoding="utf-8"?>
-<?mso-contentType ?>
-<FormTemplates xmlns="http://schemas.microsoft.com/sharepoint/v3/contenttype/forms">
-  <Display>DocumentLibraryForm</Display>
-  <Edit>DocumentLibraryForm</Edit>
-  <New>DocumentLibraryForm</New>
-</FormTemplates>
-</file>
-
 <file path=customXml/itemProps1.xml><?xml version="1.0" encoding="utf-8"?>
-<ds:datastoreItem xmlns:ds="http://schemas.openxmlformats.org/officeDocument/2006/customXml" ds:itemID="{16E8CB18-CF19-487B-A6ED-834044BC878F}">
+<ds:datastoreItem xmlns:ds="http://schemas.openxmlformats.org/officeDocument/2006/customXml" ds:itemID="{093821A7-5528-48BE-BD00-067FBFDD28D5}">
   <ds:schemaRefs>
-    <ds:schemaRef ds:uri="http://schemas.microsoft.com/office/2006/metadata/contentType"/>
-    <ds:schemaRef ds:uri="http://schemas.microsoft.com/office/2006/metadata/properties/metaAttributes"/>
-    <ds:schemaRef ds:uri="http://www.w3.org/2001/XMLSchema"/>
-    <ds:schemaRef ds:uri="http://schemas.microsoft.com/office/2006/metadata/properties"/>
-    <ds:schemaRef ds:uri="http://schemas.microsoft.com/sharepoint/v3"/>
-    <ds:schemaRef ds:uri="569b343d-e775-480b-9b2b-6a6986deb9b0"/>
-    <ds:schemaRef ds:uri="11245976-3b4d-4794-a754-317688483df2"/>
-    <ds:schemaRef ds:uri="http://schemas.microsoft.com/office/2006/documentManagement/types"/>
-    <ds:schemaRef ds:uri="http://schemas.microsoft.com/office/infopath/2007/PartnerControls"/>
-    <ds:schemaRef ds:uri="http://schemas.openxmlformats.org/package/2006/metadata/core-properties"/>
-    <ds:schemaRef ds:uri="http://purl.org/dc/elements/1.1/"/>
-    <ds:schemaRef ds:uri="http://purl.org/dc/terms/"/>
-    <ds:schemaRef ds:uri="http://schemas.microsoft.com/internal/obd"/>
+    <ds:schemaRef ds:uri="http://schemas.microsoft.com/sharepoint/v3/contenttype/forms"/>
   </ds:schemaRefs>
 </ds:datastoreItem>
 </file>
@@ -18817,9 +22053,21 @@
 </file>
 
 <file path=customXml/itemProps3.xml><?xml version="1.0" encoding="utf-8"?>
-<ds:datastoreItem xmlns:ds="http://schemas.openxmlformats.org/officeDocument/2006/customXml" ds:itemID="{093821A7-5528-48BE-BD00-067FBFDD28D5}">
+<ds:datastoreItem xmlns:ds="http://schemas.openxmlformats.org/officeDocument/2006/customXml" ds:itemID="{16E8CB18-CF19-487B-A6ED-834044BC878F}">
   <ds:schemaRefs>
-    <ds:schemaRef ds:uri="http://schemas.microsoft.com/sharepoint/v3/contenttype/forms"/>
+    <ds:schemaRef ds:uri="http://schemas.microsoft.com/office/2006/metadata/contentType"/>
+    <ds:schemaRef ds:uri="http://schemas.microsoft.com/office/2006/metadata/properties/metaAttributes"/>
+    <ds:schemaRef ds:uri="http://www.w3.org/2001/XMLSchema"/>
+    <ds:schemaRef ds:uri="http://schemas.microsoft.com/office/2006/metadata/properties"/>
+    <ds:schemaRef ds:uri="http://schemas.microsoft.com/sharepoint/v3"/>
+    <ds:schemaRef ds:uri="569b343d-e775-480b-9b2b-6a6986deb9b0"/>
+    <ds:schemaRef ds:uri="11245976-3b4d-4794-a754-317688483df2"/>
+    <ds:schemaRef ds:uri="http://schemas.microsoft.com/office/2006/documentManagement/types"/>
+    <ds:schemaRef ds:uri="http://schemas.microsoft.com/office/infopath/2007/PartnerControls"/>
+    <ds:schemaRef ds:uri="http://schemas.openxmlformats.org/package/2006/metadata/core-properties"/>
+    <ds:schemaRef ds:uri="http://purl.org/dc/elements/1.1/"/>
+    <ds:schemaRef ds:uri="http://purl.org/dc/terms/"/>
+    <ds:schemaRef ds:uri="http://schemas.microsoft.com/internal/obd"/>
   </ds:schemaRefs>
 </ds:datastoreItem>
 </file>
</xml_diff>